<commit_message>
Added first lesson/introduction slide exports.
</commit_message>
<xml_diff>
--- a/slides/01-Introduction-into-Course.pptx
+++ b/slides/01-Introduction-into-Course.pptx
@@ -59,7 +59,7 @@
       </p:grpSpPr>
       <p:sp>
         <p:nvSpPr>
-          <p:cNvPr id="26" name="PlaceHolder 1"/>
+          <p:cNvPr id="23" name="PlaceHolder 1"/>
           <p:cNvSpPr>
             <a:spLocks noGrp="1"/>
           </p:cNvSpPr>
@@ -69,8 +69,8 @@
         </p:nvSpPr>
         <p:spPr>
           <a:xfrm>
-            <a:off x="457200" y="274680"/>
-            <a:ext cx="8229240" cy="1142640"/>
+            <a:off x="457200" y="273600"/>
+            <a:ext cx="8229240" cy="1144800"/>
           </a:xfrm>
           <a:prstGeom prst="rect">
             <a:avLst/>
@@ -79,13 +79,14 @@
         <p:txBody>
           <a:bodyPr lIns="0" rIns="0" tIns="0" bIns="0" anchor="ctr"/>
           <a:p>
-            <a:endParaRPr/>
-          </a:p>
-        </p:txBody>
-      </p:sp>
-      <p:sp>
-        <p:nvSpPr>
-          <p:cNvPr id="27" name="PlaceHolder 2"/>
+            <a:pPr algn="ctr"/>
+            <a:endParaRPr/>
+          </a:p>
+        </p:txBody>
+      </p:sp>
+      <p:sp>
+        <p:nvSpPr>
+          <p:cNvPr id="24" name="PlaceHolder 2"/>
           <p:cNvSpPr>
             <a:spLocks noGrp="1"/>
           </p:cNvSpPr>
@@ -95,8 +96,8 @@
         </p:nvSpPr>
         <p:spPr>
           <a:xfrm>
-            <a:off x="457200" y="1600200"/>
-            <a:ext cx="8229240" cy="2158560"/>
+            <a:off x="457200" y="1604520"/>
+            <a:ext cx="8229240" cy="1896840"/>
           </a:xfrm>
           <a:prstGeom prst="rect">
             <a:avLst/>
@@ -111,7 +112,7 @@
       </p:sp>
       <p:sp>
         <p:nvSpPr>
-          <p:cNvPr id="28" name="PlaceHolder 3"/>
+          <p:cNvPr id="25" name="PlaceHolder 3"/>
           <p:cNvSpPr>
             <a:spLocks noGrp="1"/>
           </p:cNvSpPr>
@@ -121,8 +122,8 @@
         </p:nvSpPr>
         <p:spPr>
           <a:xfrm>
-            <a:off x="457200" y="3964320"/>
-            <a:ext cx="8229240" cy="2158560"/>
+            <a:off x="457200" y="3682080"/>
+            <a:ext cx="8229240" cy="1896840"/>
           </a:xfrm>
           <a:prstGeom prst="rect">
             <a:avLst/>
@@ -159,7 +160,7 @@
       </p:grpSpPr>
       <p:sp>
         <p:nvSpPr>
-          <p:cNvPr id="29" name="PlaceHolder 1"/>
+          <p:cNvPr id="26" name="PlaceHolder 1"/>
           <p:cNvSpPr>
             <a:spLocks noGrp="1"/>
           </p:cNvSpPr>
@@ -169,8 +170,8 @@
         </p:nvSpPr>
         <p:spPr>
           <a:xfrm>
-            <a:off x="457200" y="274680"/>
-            <a:ext cx="8229240" cy="1142640"/>
+            <a:off x="457200" y="273600"/>
+            <a:ext cx="8229240" cy="1144800"/>
           </a:xfrm>
           <a:prstGeom prst="rect">
             <a:avLst/>
@@ -179,13 +180,14 @@
         <p:txBody>
           <a:bodyPr lIns="0" rIns="0" tIns="0" bIns="0" anchor="ctr"/>
           <a:p>
-            <a:endParaRPr/>
-          </a:p>
-        </p:txBody>
-      </p:sp>
-      <p:sp>
-        <p:nvSpPr>
-          <p:cNvPr id="30" name="PlaceHolder 2"/>
+            <a:pPr algn="ctr"/>
+            <a:endParaRPr/>
+          </a:p>
+        </p:txBody>
+      </p:sp>
+      <p:sp>
+        <p:nvSpPr>
+          <p:cNvPr id="27" name="PlaceHolder 2"/>
           <p:cNvSpPr>
             <a:spLocks noGrp="1"/>
           </p:cNvSpPr>
@@ -195,8 +197,8 @@
         </p:nvSpPr>
         <p:spPr>
           <a:xfrm>
-            <a:off x="457200" y="1600200"/>
-            <a:ext cx="4015800" cy="2158560"/>
+            <a:off x="457200" y="1604520"/>
+            <a:ext cx="4015800" cy="1896840"/>
           </a:xfrm>
           <a:prstGeom prst="rect">
             <a:avLst/>
@@ -211,7 +213,7 @@
       </p:sp>
       <p:sp>
         <p:nvSpPr>
-          <p:cNvPr id="31" name="PlaceHolder 3"/>
+          <p:cNvPr id="28" name="PlaceHolder 3"/>
           <p:cNvSpPr>
             <a:spLocks noGrp="1"/>
           </p:cNvSpPr>
@@ -221,8 +223,8 @@
         </p:nvSpPr>
         <p:spPr>
           <a:xfrm>
-            <a:off x="4674240" y="1600200"/>
-            <a:ext cx="4015800" cy="2158560"/>
+            <a:off x="4674240" y="1604520"/>
+            <a:ext cx="4015800" cy="1896840"/>
           </a:xfrm>
           <a:prstGeom prst="rect">
             <a:avLst/>
@@ -237,7 +239,7 @@
       </p:sp>
       <p:sp>
         <p:nvSpPr>
-          <p:cNvPr id="32" name="PlaceHolder 4"/>
+          <p:cNvPr id="29" name="PlaceHolder 4"/>
           <p:cNvSpPr>
             <a:spLocks noGrp="1"/>
           </p:cNvSpPr>
@@ -247,8 +249,8 @@
         </p:nvSpPr>
         <p:spPr>
           <a:xfrm>
-            <a:off x="4674240" y="3964320"/>
-            <a:ext cx="4015800" cy="2158560"/>
+            <a:off x="4674240" y="3682080"/>
+            <a:ext cx="4015800" cy="1896840"/>
           </a:xfrm>
           <a:prstGeom prst="rect">
             <a:avLst/>
@@ -263,7 +265,7 @@
       </p:sp>
       <p:sp>
         <p:nvSpPr>
-          <p:cNvPr id="33" name="PlaceHolder 5"/>
+          <p:cNvPr id="30" name="PlaceHolder 5"/>
           <p:cNvSpPr>
             <a:spLocks noGrp="1"/>
           </p:cNvSpPr>
@@ -273,8 +275,8 @@
         </p:nvSpPr>
         <p:spPr>
           <a:xfrm>
-            <a:off x="457200" y="3964320"/>
-            <a:ext cx="4015800" cy="2158560"/>
+            <a:off x="457200" y="3682080"/>
+            <a:ext cx="4015800" cy="1896840"/>
           </a:xfrm>
           <a:prstGeom prst="rect">
             <a:avLst/>
@@ -311,7 +313,7 @@
       </p:grpSpPr>
       <p:sp>
         <p:nvSpPr>
-          <p:cNvPr id="34" name="PlaceHolder 1"/>
+          <p:cNvPr id="31" name="PlaceHolder 1"/>
           <p:cNvSpPr>
             <a:spLocks noGrp="1"/>
           </p:cNvSpPr>
@@ -321,8 +323,8 @@
         </p:nvSpPr>
         <p:spPr>
           <a:xfrm>
-            <a:off x="457200" y="274680"/>
-            <a:ext cx="8229240" cy="1142640"/>
+            <a:off x="457200" y="273600"/>
+            <a:ext cx="8229240" cy="1144800"/>
           </a:xfrm>
           <a:prstGeom prst="rect">
             <a:avLst/>
@@ -331,13 +333,14 @@
         <p:txBody>
           <a:bodyPr lIns="0" rIns="0" tIns="0" bIns="0" anchor="ctr"/>
           <a:p>
-            <a:endParaRPr/>
-          </a:p>
-        </p:txBody>
-      </p:sp>
-      <p:sp>
-        <p:nvSpPr>
-          <p:cNvPr id="35" name="PlaceHolder 2"/>
+            <a:pPr algn="ctr"/>
+            <a:endParaRPr/>
+          </a:p>
+        </p:txBody>
+      </p:sp>
+      <p:sp>
+        <p:nvSpPr>
+          <p:cNvPr id="32" name="PlaceHolder 2"/>
           <p:cNvSpPr>
             <a:spLocks noGrp="1"/>
           </p:cNvSpPr>
@@ -347,8 +350,8 @@
         </p:nvSpPr>
         <p:spPr>
           <a:xfrm>
-            <a:off x="457200" y="1600200"/>
-            <a:ext cx="8229240" cy="4525560"/>
+            <a:off x="457200" y="1604520"/>
+            <a:ext cx="8229240" cy="3977280"/>
           </a:xfrm>
           <a:prstGeom prst="rect">
             <a:avLst/>
@@ -363,7 +366,7 @@
       </p:sp>
       <p:sp>
         <p:nvSpPr>
-          <p:cNvPr id="36" name="PlaceHolder 3"/>
+          <p:cNvPr id="33" name="PlaceHolder 3"/>
           <p:cNvSpPr>
             <a:spLocks noGrp="1"/>
           </p:cNvSpPr>
@@ -373,8 +376,8 @@
         </p:nvSpPr>
         <p:spPr>
           <a:xfrm>
-            <a:off x="457200" y="1600200"/>
-            <a:ext cx="8229240" cy="4525560"/>
+            <a:off x="457200" y="1604520"/>
+            <a:ext cx="8229240" cy="3977280"/>
           </a:xfrm>
           <a:prstGeom prst="rect">
             <a:avLst/>
@@ -389,7 +392,7 @@
       </p:sp>
       <p:pic>
         <p:nvPicPr>
-          <p:cNvPr id="37" name="" descr=""/>
+          <p:cNvPr id="34" name="" descr=""/>
           <p:cNvPicPr/>
           <p:nvPr/>
         </p:nvPicPr>
@@ -399,8 +402,8 @@
         </p:blipFill>
         <p:spPr>
           <a:xfrm>
-            <a:off x="1735560" y="1599840"/>
-            <a:ext cx="5671800" cy="4525560"/>
+            <a:off x="2079000" y="1604520"/>
+            <a:ext cx="4984920" cy="3977280"/>
           </a:xfrm>
           <a:prstGeom prst="rect">
             <a:avLst/>
@@ -412,7 +415,7 @@
       </p:pic>
       <p:pic>
         <p:nvPicPr>
-          <p:cNvPr id="38" name="" descr=""/>
+          <p:cNvPr id="35" name="" descr=""/>
           <p:cNvPicPr/>
           <p:nvPr/>
         </p:nvPicPr>
@@ -422,8 +425,8 @@
         </p:blipFill>
         <p:spPr>
           <a:xfrm>
-            <a:off x="1735560" y="1599840"/>
-            <a:ext cx="5671800" cy="4525560"/>
+            <a:off x="2079000" y="1604520"/>
+            <a:ext cx="4984920" cy="3977280"/>
           </a:xfrm>
           <a:prstGeom prst="rect">
             <a:avLst/>
@@ -479,7 +482,7 @@
       </p:grpSpPr>
       <p:sp>
         <p:nvSpPr>
-          <p:cNvPr id="44" name="PlaceHolder 1"/>
+          <p:cNvPr id="38" name="PlaceHolder 1"/>
           <p:cNvSpPr>
             <a:spLocks noGrp="1"/>
           </p:cNvSpPr>
@@ -489,8 +492,8 @@
         </p:nvSpPr>
         <p:spPr>
           <a:xfrm>
-            <a:off x="457200" y="274680"/>
-            <a:ext cx="8229240" cy="1142640"/>
+            <a:off x="457200" y="273600"/>
+            <a:ext cx="8229240" cy="1144800"/>
           </a:xfrm>
           <a:prstGeom prst="rect">
             <a:avLst/>
@@ -499,13 +502,14 @@
         <p:txBody>
           <a:bodyPr lIns="0" rIns="0" tIns="0" bIns="0" anchor="ctr"/>
           <a:p>
-            <a:endParaRPr/>
-          </a:p>
-        </p:txBody>
-      </p:sp>
-      <p:sp>
-        <p:nvSpPr>
-          <p:cNvPr id="45" name="PlaceHolder 2"/>
+            <a:pPr algn="ctr"/>
+            <a:endParaRPr/>
+          </a:p>
+        </p:txBody>
+      </p:sp>
+      <p:sp>
+        <p:nvSpPr>
+          <p:cNvPr id="39" name="PlaceHolder 2"/>
           <p:cNvSpPr>
             <a:spLocks noGrp="1"/>
           </p:cNvSpPr>
@@ -515,8 +519,8 @@
         </p:nvSpPr>
         <p:spPr>
           <a:xfrm>
-            <a:off x="457200" y="1600200"/>
-            <a:ext cx="8229240" cy="4525560"/>
+            <a:off x="457200" y="1604520"/>
+            <a:ext cx="8229240" cy="3977280"/>
           </a:xfrm>
           <a:prstGeom prst="rect">
             <a:avLst/>
@@ -554,7 +558,7 @@
       </p:grpSpPr>
       <p:sp>
         <p:nvSpPr>
-          <p:cNvPr id="46" name="PlaceHolder 1"/>
+          <p:cNvPr id="40" name="PlaceHolder 1"/>
           <p:cNvSpPr>
             <a:spLocks noGrp="1"/>
           </p:cNvSpPr>
@@ -564,8 +568,8 @@
         </p:nvSpPr>
         <p:spPr>
           <a:xfrm>
-            <a:off x="457200" y="274680"/>
-            <a:ext cx="8229240" cy="1142640"/>
+            <a:off x="457200" y="273600"/>
+            <a:ext cx="8229240" cy="1144800"/>
           </a:xfrm>
           <a:prstGeom prst="rect">
             <a:avLst/>
@@ -574,13 +578,14 @@
         <p:txBody>
           <a:bodyPr lIns="0" rIns="0" tIns="0" bIns="0" anchor="ctr"/>
           <a:p>
-            <a:endParaRPr/>
-          </a:p>
-        </p:txBody>
-      </p:sp>
-      <p:sp>
-        <p:nvSpPr>
-          <p:cNvPr id="47" name="PlaceHolder 2"/>
+            <a:pPr algn="ctr"/>
+            <a:endParaRPr/>
+          </a:p>
+        </p:txBody>
+      </p:sp>
+      <p:sp>
+        <p:nvSpPr>
+          <p:cNvPr id="41" name="PlaceHolder 2"/>
           <p:cNvSpPr>
             <a:spLocks noGrp="1"/>
           </p:cNvSpPr>
@@ -590,8 +595,8 @@
         </p:nvSpPr>
         <p:spPr>
           <a:xfrm>
-            <a:off x="457200" y="1600200"/>
-            <a:ext cx="8229240" cy="4525560"/>
+            <a:off x="457200" y="1604520"/>
+            <a:ext cx="8229240" cy="3977280"/>
           </a:xfrm>
           <a:prstGeom prst="rect">
             <a:avLst/>
@@ -628,7 +633,7 @@
       </p:grpSpPr>
       <p:sp>
         <p:nvSpPr>
-          <p:cNvPr id="48" name="PlaceHolder 1"/>
+          <p:cNvPr id="42" name="PlaceHolder 1"/>
           <p:cNvSpPr>
             <a:spLocks noGrp="1"/>
           </p:cNvSpPr>
@@ -638,8 +643,8 @@
         </p:nvSpPr>
         <p:spPr>
           <a:xfrm>
-            <a:off x="457200" y="274680"/>
-            <a:ext cx="8229240" cy="1142640"/>
+            <a:off x="457200" y="273600"/>
+            <a:ext cx="8229240" cy="1144800"/>
           </a:xfrm>
           <a:prstGeom prst="rect">
             <a:avLst/>
@@ -648,13 +653,14 @@
         <p:txBody>
           <a:bodyPr lIns="0" rIns="0" tIns="0" bIns="0" anchor="ctr"/>
           <a:p>
-            <a:endParaRPr/>
-          </a:p>
-        </p:txBody>
-      </p:sp>
-      <p:sp>
-        <p:nvSpPr>
-          <p:cNvPr id="49" name="PlaceHolder 2"/>
+            <a:pPr algn="ctr"/>
+            <a:endParaRPr/>
+          </a:p>
+        </p:txBody>
+      </p:sp>
+      <p:sp>
+        <p:nvSpPr>
+          <p:cNvPr id="43" name="PlaceHolder 2"/>
           <p:cNvSpPr>
             <a:spLocks noGrp="1"/>
           </p:cNvSpPr>
@@ -664,8 +670,8 @@
         </p:nvSpPr>
         <p:spPr>
           <a:xfrm>
-            <a:off x="457200" y="1600200"/>
-            <a:ext cx="4015800" cy="4525560"/>
+            <a:off x="457200" y="1604520"/>
+            <a:ext cx="4015800" cy="3977280"/>
           </a:xfrm>
           <a:prstGeom prst="rect">
             <a:avLst/>
@@ -680,7 +686,7 @@
       </p:sp>
       <p:sp>
         <p:nvSpPr>
-          <p:cNvPr id="50" name="PlaceHolder 3"/>
+          <p:cNvPr id="44" name="PlaceHolder 3"/>
           <p:cNvSpPr>
             <a:spLocks noGrp="1"/>
           </p:cNvSpPr>
@@ -690,8 +696,8 @@
         </p:nvSpPr>
         <p:spPr>
           <a:xfrm>
-            <a:off x="4674240" y="1600200"/>
-            <a:ext cx="4015800" cy="4525560"/>
+            <a:off x="4674240" y="1604520"/>
+            <a:ext cx="4015800" cy="3977280"/>
           </a:xfrm>
           <a:prstGeom prst="rect">
             <a:avLst/>
@@ -728,7 +734,7 @@
       </p:grpSpPr>
       <p:sp>
         <p:nvSpPr>
-          <p:cNvPr id="51" name="PlaceHolder 1"/>
+          <p:cNvPr id="45" name="PlaceHolder 1"/>
           <p:cNvSpPr>
             <a:spLocks noGrp="1"/>
           </p:cNvSpPr>
@@ -738,8 +744,8 @@
         </p:nvSpPr>
         <p:spPr>
           <a:xfrm>
-            <a:off x="457200" y="274680"/>
-            <a:ext cx="8229240" cy="1142640"/>
+            <a:off x="457200" y="273600"/>
+            <a:ext cx="8229240" cy="1144800"/>
           </a:xfrm>
           <a:prstGeom prst="rect">
             <a:avLst/>
@@ -748,6 +754,7 @@
         <p:txBody>
           <a:bodyPr lIns="0" rIns="0" tIns="0" bIns="0" anchor="ctr"/>
           <a:p>
+            <a:pPr algn="ctr"/>
             <a:endParaRPr/>
           </a:p>
         </p:txBody>
@@ -776,7 +783,7 @@
       </p:grpSpPr>
       <p:sp>
         <p:nvSpPr>
-          <p:cNvPr id="52" name="PlaceHolder 1"/>
+          <p:cNvPr id="46" name="PlaceHolder 1"/>
           <p:cNvSpPr>
             <a:spLocks noGrp="1"/>
           </p:cNvSpPr>
@@ -786,8 +793,8 @@
         </p:nvSpPr>
         <p:spPr>
           <a:xfrm>
-            <a:off x="457200" y="274680"/>
-            <a:ext cx="8229240" cy="5297760"/>
+            <a:off x="457200" y="273600"/>
+            <a:ext cx="8229240" cy="5307840"/>
           </a:xfrm>
           <a:prstGeom prst="rect">
             <a:avLst/>
@@ -825,7 +832,7 @@
       </p:grpSpPr>
       <p:sp>
         <p:nvSpPr>
-          <p:cNvPr id="53" name="PlaceHolder 1"/>
+          <p:cNvPr id="47" name="PlaceHolder 1"/>
           <p:cNvSpPr>
             <a:spLocks noGrp="1"/>
           </p:cNvSpPr>
@@ -835,8 +842,8 @@
         </p:nvSpPr>
         <p:spPr>
           <a:xfrm>
-            <a:off x="457200" y="274680"/>
-            <a:ext cx="8229240" cy="1142640"/>
+            <a:off x="457200" y="273600"/>
+            <a:ext cx="8229240" cy="1144800"/>
           </a:xfrm>
           <a:prstGeom prst="rect">
             <a:avLst/>
@@ -845,13 +852,14 @@
         <p:txBody>
           <a:bodyPr lIns="0" rIns="0" tIns="0" bIns="0" anchor="ctr"/>
           <a:p>
-            <a:endParaRPr/>
-          </a:p>
-        </p:txBody>
-      </p:sp>
-      <p:sp>
-        <p:nvSpPr>
-          <p:cNvPr id="54" name="PlaceHolder 2"/>
+            <a:pPr algn="ctr"/>
+            <a:endParaRPr/>
+          </a:p>
+        </p:txBody>
+      </p:sp>
+      <p:sp>
+        <p:nvSpPr>
+          <p:cNvPr id="48" name="PlaceHolder 2"/>
           <p:cNvSpPr>
             <a:spLocks noGrp="1"/>
           </p:cNvSpPr>
@@ -861,8 +869,8 @@
         </p:nvSpPr>
         <p:spPr>
           <a:xfrm>
-            <a:off x="457200" y="1600200"/>
-            <a:ext cx="4015800" cy="2158560"/>
+            <a:off x="457200" y="1604520"/>
+            <a:ext cx="4015800" cy="1896840"/>
           </a:xfrm>
           <a:prstGeom prst="rect">
             <a:avLst/>
@@ -877,7 +885,7 @@
       </p:sp>
       <p:sp>
         <p:nvSpPr>
-          <p:cNvPr id="55" name="PlaceHolder 3"/>
+          <p:cNvPr id="49" name="PlaceHolder 3"/>
           <p:cNvSpPr>
             <a:spLocks noGrp="1"/>
           </p:cNvSpPr>
@@ -887,8 +895,8 @@
         </p:nvSpPr>
         <p:spPr>
           <a:xfrm>
-            <a:off x="457200" y="3964320"/>
-            <a:ext cx="4015800" cy="2158560"/>
+            <a:off x="457200" y="3682080"/>
+            <a:ext cx="4015800" cy="1896840"/>
           </a:xfrm>
           <a:prstGeom prst="rect">
             <a:avLst/>
@@ -903,7 +911,7 @@
       </p:sp>
       <p:sp>
         <p:nvSpPr>
-          <p:cNvPr id="56" name="PlaceHolder 4"/>
+          <p:cNvPr id="50" name="PlaceHolder 4"/>
           <p:cNvSpPr>
             <a:spLocks noGrp="1"/>
           </p:cNvSpPr>
@@ -913,8 +921,8 @@
         </p:nvSpPr>
         <p:spPr>
           <a:xfrm>
-            <a:off x="4674240" y="1600200"/>
-            <a:ext cx="4015800" cy="4525560"/>
+            <a:off x="4674240" y="1604520"/>
+            <a:ext cx="4015800" cy="3977280"/>
           </a:xfrm>
           <a:prstGeom prst="rect">
             <a:avLst/>
@@ -951,7 +959,7 @@
       </p:grpSpPr>
       <p:sp>
         <p:nvSpPr>
-          <p:cNvPr id="5" name="PlaceHolder 1"/>
+          <p:cNvPr id="2" name="PlaceHolder 1"/>
           <p:cNvSpPr>
             <a:spLocks noGrp="1"/>
           </p:cNvSpPr>
@@ -961,8 +969,8 @@
         </p:nvSpPr>
         <p:spPr>
           <a:xfrm>
-            <a:off x="457200" y="274680"/>
-            <a:ext cx="8229240" cy="1142640"/>
+            <a:off x="457200" y="273600"/>
+            <a:ext cx="8229240" cy="1144800"/>
           </a:xfrm>
           <a:prstGeom prst="rect">
             <a:avLst/>
@@ -971,13 +979,14 @@
         <p:txBody>
           <a:bodyPr lIns="0" rIns="0" tIns="0" bIns="0" anchor="ctr"/>
           <a:p>
-            <a:endParaRPr/>
-          </a:p>
-        </p:txBody>
-      </p:sp>
-      <p:sp>
-        <p:nvSpPr>
-          <p:cNvPr id="6" name="PlaceHolder 2"/>
+            <a:pPr algn="ctr"/>
+            <a:endParaRPr/>
+          </a:p>
+        </p:txBody>
+      </p:sp>
+      <p:sp>
+        <p:nvSpPr>
+          <p:cNvPr id="3" name="PlaceHolder 2"/>
           <p:cNvSpPr>
             <a:spLocks noGrp="1"/>
           </p:cNvSpPr>
@@ -987,8 +996,8 @@
         </p:nvSpPr>
         <p:spPr>
           <a:xfrm>
-            <a:off x="457200" y="1600200"/>
-            <a:ext cx="8229240" cy="4525560"/>
+            <a:off x="457200" y="1604520"/>
+            <a:ext cx="8229240" cy="3977280"/>
           </a:xfrm>
           <a:prstGeom prst="rect">
             <a:avLst/>
@@ -1026,7 +1035,7 @@
       </p:grpSpPr>
       <p:sp>
         <p:nvSpPr>
-          <p:cNvPr id="57" name="PlaceHolder 1"/>
+          <p:cNvPr id="51" name="PlaceHolder 1"/>
           <p:cNvSpPr>
             <a:spLocks noGrp="1"/>
           </p:cNvSpPr>
@@ -1036,8 +1045,8 @@
         </p:nvSpPr>
         <p:spPr>
           <a:xfrm>
-            <a:off x="457200" y="274680"/>
-            <a:ext cx="8229240" cy="1142640"/>
+            <a:off x="457200" y="273600"/>
+            <a:ext cx="8229240" cy="1144800"/>
           </a:xfrm>
           <a:prstGeom prst="rect">
             <a:avLst/>
@@ -1046,13 +1055,14 @@
         <p:txBody>
           <a:bodyPr lIns="0" rIns="0" tIns="0" bIns="0" anchor="ctr"/>
           <a:p>
-            <a:endParaRPr/>
-          </a:p>
-        </p:txBody>
-      </p:sp>
-      <p:sp>
-        <p:nvSpPr>
-          <p:cNvPr id="58" name="PlaceHolder 2"/>
+            <a:pPr algn="ctr"/>
+            <a:endParaRPr/>
+          </a:p>
+        </p:txBody>
+      </p:sp>
+      <p:sp>
+        <p:nvSpPr>
+          <p:cNvPr id="52" name="PlaceHolder 2"/>
           <p:cNvSpPr>
             <a:spLocks noGrp="1"/>
           </p:cNvSpPr>
@@ -1062,8 +1072,8 @@
         </p:nvSpPr>
         <p:spPr>
           <a:xfrm>
-            <a:off x="457200" y="1600200"/>
-            <a:ext cx="4015800" cy="4525560"/>
+            <a:off x="457200" y="1604520"/>
+            <a:ext cx="4015800" cy="3977280"/>
           </a:xfrm>
           <a:prstGeom prst="rect">
             <a:avLst/>
@@ -1078,7 +1088,7 @@
       </p:sp>
       <p:sp>
         <p:nvSpPr>
-          <p:cNvPr id="59" name="PlaceHolder 3"/>
+          <p:cNvPr id="53" name="PlaceHolder 3"/>
           <p:cNvSpPr>
             <a:spLocks noGrp="1"/>
           </p:cNvSpPr>
@@ -1088,8 +1098,8 @@
         </p:nvSpPr>
         <p:spPr>
           <a:xfrm>
-            <a:off x="4674240" y="1600200"/>
-            <a:ext cx="4015800" cy="2158560"/>
+            <a:off x="4674240" y="1604520"/>
+            <a:ext cx="4015800" cy="1896840"/>
           </a:xfrm>
           <a:prstGeom prst="rect">
             <a:avLst/>
@@ -1104,7 +1114,7 @@
       </p:sp>
       <p:sp>
         <p:nvSpPr>
-          <p:cNvPr id="60" name="PlaceHolder 4"/>
+          <p:cNvPr id="54" name="PlaceHolder 4"/>
           <p:cNvSpPr>
             <a:spLocks noGrp="1"/>
           </p:cNvSpPr>
@@ -1114,8 +1124,8 @@
         </p:nvSpPr>
         <p:spPr>
           <a:xfrm>
-            <a:off x="4674240" y="3964320"/>
-            <a:ext cx="4015800" cy="2158560"/>
+            <a:off x="4674240" y="3682080"/>
+            <a:ext cx="4015800" cy="1896840"/>
           </a:xfrm>
           <a:prstGeom prst="rect">
             <a:avLst/>
@@ -1152,7 +1162,7 @@
       </p:grpSpPr>
       <p:sp>
         <p:nvSpPr>
-          <p:cNvPr id="61" name="PlaceHolder 1"/>
+          <p:cNvPr id="55" name="PlaceHolder 1"/>
           <p:cNvSpPr>
             <a:spLocks noGrp="1"/>
           </p:cNvSpPr>
@@ -1162,8 +1172,8 @@
         </p:nvSpPr>
         <p:spPr>
           <a:xfrm>
-            <a:off x="457200" y="274680"/>
-            <a:ext cx="8229240" cy="1142640"/>
+            <a:off x="457200" y="273600"/>
+            <a:ext cx="8229240" cy="1144800"/>
           </a:xfrm>
           <a:prstGeom prst="rect">
             <a:avLst/>
@@ -1172,13 +1182,14 @@
         <p:txBody>
           <a:bodyPr lIns="0" rIns="0" tIns="0" bIns="0" anchor="ctr"/>
           <a:p>
-            <a:endParaRPr/>
-          </a:p>
-        </p:txBody>
-      </p:sp>
-      <p:sp>
-        <p:nvSpPr>
-          <p:cNvPr id="62" name="PlaceHolder 2"/>
+            <a:pPr algn="ctr"/>
+            <a:endParaRPr/>
+          </a:p>
+        </p:txBody>
+      </p:sp>
+      <p:sp>
+        <p:nvSpPr>
+          <p:cNvPr id="56" name="PlaceHolder 2"/>
           <p:cNvSpPr>
             <a:spLocks noGrp="1"/>
           </p:cNvSpPr>
@@ -1188,8 +1199,8 @@
         </p:nvSpPr>
         <p:spPr>
           <a:xfrm>
-            <a:off x="457200" y="1600200"/>
-            <a:ext cx="4015800" cy="2158560"/>
+            <a:off x="457200" y="1604520"/>
+            <a:ext cx="4015800" cy="1896840"/>
           </a:xfrm>
           <a:prstGeom prst="rect">
             <a:avLst/>
@@ -1204,7 +1215,7 @@
       </p:sp>
       <p:sp>
         <p:nvSpPr>
-          <p:cNvPr id="63" name="PlaceHolder 3"/>
+          <p:cNvPr id="57" name="PlaceHolder 3"/>
           <p:cNvSpPr>
             <a:spLocks noGrp="1"/>
           </p:cNvSpPr>
@@ -1214,8 +1225,8 @@
         </p:nvSpPr>
         <p:spPr>
           <a:xfrm>
-            <a:off x="4674240" y="1600200"/>
-            <a:ext cx="4015800" cy="2158560"/>
+            <a:off x="4674240" y="1604520"/>
+            <a:ext cx="4015800" cy="1896840"/>
           </a:xfrm>
           <a:prstGeom prst="rect">
             <a:avLst/>
@@ -1230,7 +1241,7 @@
       </p:sp>
       <p:sp>
         <p:nvSpPr>
-          <p:cNvPr id="64" name="PlaceHolder 4"/>
+          <p:cNvPr id="58" name="PlaceHolder 4"/>
           <p:cNvSpPr>
             <a:spLocks noGrp="1"/>
           </p:cNvSpPr>
@@ -1240,8 +1251,8 @@
         </p:nvSpPr>
         <p:spPr>
           <a:xfrm>
-            <a:off x="457200" y="3964320"/>
-            <a:ext cx="8229240" cy="2158560"/>
+            <a:off x="457200" y="3682080"/>
+            <a:ext cx="8229240" cy="1896840"/>
           </a:xfrm>
           <a:prstGeom prst="rect">
             <a:avLst/>
@@ -1278,7 +1289,7 @@
       </p:grpSpPr>
       <p:sp>
         <p:nvSpPr>
-          <p:cNvPr id="65" name="PlaceHolder 1"/>
+          <p:cNvPr id="59" name="PlaceHolder 1"/>
           <p:cNvSpPr>
             <a:spLocks noGrp="1"/>
           </p:cNvSpPr>
@@ -1288,8 +1299,8 @@
         </p:nvSpPr>
         <p:spPr>
           <a:xfrm>
-            <a:off x="457200" y="274680"/>
-            <a:ext cx="8229240" cy="1142640"/>
+            <a:off x="457200" y="273600"/>
+            <a:ext cx="8229240" cy="1144800"/>
           </a:xfrm>
           <a:prstGeom prst="rect">
             <a:avLst/>
@@ -1298,13 +1309,14 @@
         <p:txBody>
           <a:bodyPr lIns="0" rIns="0" tIns="0" bIns="0" anchor="ctr"/>
           <a:p>
-            <a:endParaRPr/>
-          </a:p>
-        </p:txBody>
-      </p:sp>
-      <p:sp>
-        <p:nvSpPr>
-          <p:cNvPr id="66" name="PlaceHolder 2"/>
+            <a:pPr algn="ctr"/>
+            <a:endParaRPr/>
+          </a:p>
+        </p:txBody>
+      </p:sp>
+      <p:sp>
+        <p:nvSpPr>
+          <p:cNvPr id="60" name="PlaceHolder 2"/>
           <p:cNvSpPr>
             <a:spLocks noGrp="1"/>
           </p:cNvSpPr>
@@ -1314,8 +1326,8 @@
         </p:nvSpPr>
         <p:spPr>
           <a:xfrm>
-            <a:off x="457200" y="1600200"/>
-            <a:ext cx="8229240" cy="2158560"/>
+            <a:off x="457200" y="1604520"/>
+            <a:ext cx="8229240" cy="1896840"/>
           </a:xfrm>
           <a:prstGeom prst="rect">
             <a:avLst/>
@@ -1330,7 +1342,7 @@
       </p:sp>
       <p:sp>
         <p:nvSpPr>
-          <p:cNvPr id="67" name="PlaceHolder 3"/>
+          <p:cNvPr id="61" name="PlaceHolder 3"/>
           <p:cNvSpPr>
             <a:spLocks noGrp="1"/>
           </p:cNvSpPr>
@@ -1340,8 +1352,8 @@
         </p:nvSpPr>
         <p:spPr>
           <a:xfrm>
-            <a:off x="457200" y="3964320"/>
-            <a:ext cx="8229240" cy="2158560"/>
+            <a:off x="457200" y="3682080"/>
+            <a:ext cx="8229240" cy="1896840"/>
           </a:xfrm>
           <a:prstGeom prst="rect">
             <a:avLst/>
@@ -1378,7 +1390,7 @@
       </p:grpSpPr>
       <p:sp>
         <p:nvSpPr>
-          <p:cNvPr id="68" name="PlaceHolder 1"/>
+          <p:cNvPr id="62" name="PlaceHolder 1"/>
           <p:cNvSpPr>
             <a:spLocks noGrp="1"/>
           </p:cNvSpPr>
@@ -1388,8 +1400,8 @@
         </p:nvSpPr>
         <p:spPr>
           <a:xfrm>
-            <a:off x="457200" y="274680"/>
-            <a:ext cx="8229240" cy="1142640"/>
+            <a:off x="457200" y="273600"/>
+            <a:ext cx="8229240" cy="1144800"/>
           </a:xfrm>
           <a:prstGeom prst="rect">
             <a:avLst/>
@@ -1398,13 +1410,14 @@
         <p:txBody>
           <a:bodyPr lIns="0" rIns="0" tIns="0" bIns="0" anchor="ctr"/>
           <a:p>
-            <a:endParaRPr/>
-          </a:p>
-        </p:txBody>
-      </p:sp>
-      <p:sp>
-        <p:nvSpPr>
-          <p:cNvPr id="69" name="PlaceHolder 2"/>
+            <a:pPr algn="ctr"/>
+            <a:endParaRPr/>
+          </a:p>
+        </p:txBody>
+      </p:sp>
+      <p:sp>
+        <p:nvSpPr>
+          <p:cNvPr id="63" name="PlaceHolder 2"/>
           <p:cNvSpPr>
             <a:spLocks noGrp="1"/>
           </p:cNvSpPr>
@@ -1414,8 +1427,8 @@
         </p:nvSpPr>
         <p:spPr>
           <a:xfrm>
-            <a:off x="457200" y="1600200"/>
-            <a:ext cx="4015800" cy="2158560"/>
+            <a:off x="457200" y="1604520"/>
+            <a:ext cx="4015800" cy="1896840"/>
           </a:xfrm>
           <a:prstGeom prst="rect">
             <a:avLst/>
@@ -1430,7 +1443,7 @@
       </p:sp>
       <p:sp>
         <p:nvSpPr>
-          <p:cNvPr id="70" name="PlaceHolder 3"/>
+          <p:cNvPr id="64" name="PlaceHolder 3"/>
           <p:cNvSpPr>
             <a:spLocks noGrp="1"/>
           </p:cNvSpPr>
@@ -1440,8 +1453,8 @@
         </p:nvSpPr>
         <p:spPr>
           <a:xfrm>
-            <a:off x="4674240" y="1600200"/>
-            <a:ext cx="4015800" cy="2158560"/>
+            <a:off x="4674240" y="1604520"/>
+            <a:ext cx="4015800" cy="1896840"/>
           </a:xfrm>
           <a:prstGeom prst="rect">
             <a:avLst/>
@@ -1456,7 +1469,7 @@
       </p:sp>
       <p:sp>
         <p:nvSpPr>
-          <p:cNvPr id="71" name="PlaceHolder 4"/>
+          <p:cNvPr id="65" name="PlaceHolder 4"/>
           <p:cNvSpPr>
             <a:spLocks noGrp="1"/>
           </p:cNvSpPr>
@@ -1466,8 +1479,8 @@
         </p:nvSpPr>
         <p:spPr>
           <a:xfrm>
-            <a:off x="4674240" y="3964320"/>
-            <a:ext cx="4015800" cy="2158560"/>
+            <a:off x="4674240" y="3682080"/>
+            <a:ext cx="4015800" cy="1896840"/>
           </a:xfrm>
           <a:prstGeom prst="rect">
             <a:avLst/>
@@ -1482,7 +1495,7 @@
       </p:sp>
       <p:sp>
         <p:nvSpPr>
-          <p:cNvPr id="72" name="PlaceHolder 5"/>
+          <p:cNvPr id="66" name="PlaceHolder 5"/>
           <p:cNvSpPr>
             <a:spLocks noGrp="1"/>
           </p:cNvSpPr>
@@ -1492,8 +1505,8 @@
         </p:nvSpPr>
         <p:spPr>
           <a:xfrm>
-            <a:off x="457200" y="3964320"/>
-            <a:ext cx="4015800" cy="2158560"/>
+            <a:off x="457200" y="3682080"/>
+            <a:ext cx="4015800" cy="1896840"/>
           </a:xfrm>
           <a:prstGeom prst="rect">
             <a:avLst/>
@@ -1530,7 +1543,7 @@
       </p:grpSpPr>
       <p:sp>
         <p:nvSpPr>
-          <p:cNvPr id="73" name="PlaceHolder 1"/>
+          <p:cNvPr id="67" name="PlaceHolder 1"/>
           <p:cNvSpPr>
             <a:spLocks noGrp="1"/>
           </p:cNvSpPr>
@@ -1540,8 +1553,8 @@
         </p:nvSpPr>
         <p:spPr>
           <a:xfrm>
-            <a:off x="457200" y="274680"/>
-            <a:ext cx="8229240" cy="1142640"/>
+            <a:off x="457200" y="273600"/>
+            <a:ext cx="8229240" cy="1144800"/>
           </a:xfrm>
           <a:prstGeom prst="rect">
             <a:avLst/>
@@ -1550,13 +1563,14 @@
         <p:txBody>
           <a:bodyPr lIns="0" rIns="0" tIns="0" bIns="0" anchor="ctr"/>
           <a:p>
-            <a:endParaRPr/>
-          </a:p>
-        </p:txBody>
-      </p:sp>
-      <p:sp>
-        <p:nvSpPr>
-          <p:cNvPr id="74" name="PlaceHolder 2"/>
+            <a:pPr algn="ctr"/>
+            <a:endParaRPr/>
+          </a:p>
+        </p:txBody>
+      </p:sp>
+      <p:sp>
+        <p:nvSpPr>
+          <p:cNvPr id="68" name="PlaceHolder 2"/>
           <p:cNvSpPr>
             <a:spLocks noGrp="1"/>
           </p:cNvSpPr>
@@ -1566,8 +1580,8 @@
         </p:nvSpPr>
         <p:spPr>
           <a:xfrm>
-            <a:off x="457200" y="1600200"/>
-            <a:ext cx="8229240" cy="4525560"/>
+            <a:off x="457200" y="1604520"/>
+            <a:ext cx="8229240" cy="3977280"/>
           </a:xfrm>
           <a:prstGeom prst="rect">
             <a:avLst/>
@@ -1582,7 +1596,7 @@
       </p:sp>
       <p:sp>
         <p:nvSpPr>
-          <p:cNvPr id="75" name="PlaceHolder 3"/>
+          <p:cNvPr id="69" name="PlaceHolder 3"/>
           <p:cNvSpPr>
             <a:spLocks noGrp="1"/>
           </p:cNvSpPr>
@@ -1592,8 +1606,8 @@
         </p:nvSpPr>
         <p:spPr>
           <a:xfrm>
-            <a:off x="457200" y="1600200"/>
-            <a:ext cx="8229240" cy="4525560"/>
+            <a:off x="457200" y="1604520"/>
+            <a:ext cx="8229240" cy="3977280"/>
           </a:xfrm>
           <a:prstGeom prst="rect">
             <a:avLst/>
@@ -1608,7 +1622,7 @@
       </p:sp>
       <p:pic>
         <p:nvPicPr>
-          <p:cNvPr id="76" name="" descr=""/>
+          <p:cNvPr id="70" name="" descr=""/>
           <p:cNvPicPr/>
           <p:nvPr/>
         </p:nvPicPr>
@@ -1618,8 +1632,8 @@
         </p:blipFill>
         <p:spPr>
           <a:xfrm>
-            <a:off x="1735560" y="1599840"/>
-            <a:ext cx="5671800" cy="4525560"/>
+            <a:off x="2079000" y="1604520"/>
+            <a:ext cx="4984920" cy="3977280"/>
           </a:xfrm>
           <a:prstGeom prst="rect">
             <a:avLst/>
@@ -1631,7 +1645,7 @@
       </p:pic>
       <p:pic>
         <p:nvPicPr>
-          <p:cNvPr id="77" name="" descr=""/>
+          <p:cNvPr id="71" name="" descr=""/>
           <p:cNvPicPr/>
           <p:nvPr/>
         </p:nvPicPr>
@@ -1641,8 +1655,8 @@
         </p:blipFill>
         <p:spPr>
           <a:xfrm>
-            <a:off x="1735560" y="1599840"/>
-            <a:ext cx="5671800" cy="4525560"/>
+            <a:off x="2079000" y="1604520"/>
+            <a:ext cx="4984920" cy="3977280"/>
           </a:xfrm>
           <a:prstGeom prst="rect">
             <a:avLst/>
@@ -1676,7 +1690,7 @@
       </p:grpSpPr>
       <p:sp>
         <p:nvSpPr>
-          <p:cNvPr id="7" name="PlaceHolder 1"/>
+          <p:cNvPr id="4" name="PlaceHolder 1"/>
           <p:cNvSpPr>
             <a:spLocks noGrp="1"/>
           </p:cNvSpPr>
@@ -1686,8 +1700,8 @@
         </p:nvSpPr>
         <p:spPr>
           <a:xfrm>
-            <a:off x="457200" y="274680"/>
-            <a:ext cx="8229240" cy="1142640"/>
+            <a:off x="457200" y="273600"/>
+            <a:ext cx="8229240" cy="1144800"/>
           </a:xfrm>
           <a:prstGeom prst="rect">
             <a:avLst/>
@@ -1696,13 +1710,14 @@
         <p:txBody>
           <a:bodyPr lIns="0" rIns="0" tIns="0" bIns="0" anchor="ctr"/>
           <a:p>
-            <a:endParaRPr/>
-          </a:p>
-        </p:txBody>
-      </p:sp>
-      <p:sp>
-        <p:nvSpPr>
-          <p:cNvPr id="8" name="PlaceHolder 2"/>
+            <a:pPr algn="ctr"/>
+            <a:endParaRPr/>
+          </a:p>
+        </p:txBody>
+      </p:sp>
+      <p:sp>
+        <p:nvSpPr>
+          <p:cNvPr id="5" name="PlaceHolder 2"/>
           <p:cNvSpPr>
             <a:spLocks noGrp="1"/>
           </p:cNvSpPr>
@@ -1712,8 +1727,8 @@
         </p:nvSpPr>
         <p:spPr>
           <a:xfrm>
-            <a:off x="457200" y="1600200"/>
-            <a:ext cx="8229240" cy="4525560"/>
+            <a:off x="457200" y="1604520"/>
+            <a:ext cx="8229240" cy="3977280"/>
           </a:xfrm>
           <a:prstGeom prst="rect">
             <a:avLst/>
@@ -1750,7 +1765,7 @@
       </p:grpSpPr>
       <p:sp>
         <p:nvSpPr>
-          <p:cNvPr id="9" name="PlaceHolder 1"/>
+          <p:cNvPr id="6" name="PlaceHolder 1"/>
           <p:cNvSpPr>
             <a:spLocks noGrp="1"/>
           </p:cNvSpPr>
@@ -1760,8 +1775,8 @@
         </p:nvSpPr>
         <p:spPr>
           <a:xfrm>
-            <a:off x="457200" y="274680"/>
-            <a:ext cx="8229240" cy="1142640"/>
+            <a:off x="457200" y="273600"/>
+            <a:ext cx="8229240" cy="1144800"/>
           </a:xfrm>
           <a:prstGeom prst="rect">
             <a:avLst/>
@@ -1770,13 +1785,14 @@
         <p:txBody>
           <a:bodyPr lIns="0" rIns="0" tIns="0" bIns="0" anchor="ctr"/>
           <a:p>
-            <a:endParaRPr/>
-          </a:p>
-        </p:txBody>
-      </p:sp>
-      <p:sp>
-        <p:nvSpPr>
-          <p:cNvPr id="10" name="PlaceHolder 2"/>
+            <a:pPr algn="ctr"/>
+            <a:endParaRPr/>
+          </a:p>
+        </p:txBody>
+      </p:sp>
+      <p:sp>
+        <p:nvSpPr>
+          <p:cNvPr id="7" name="PlaceHolder 2"/>
           <p:cNvSpPr>
             <a:spLocks noGrp="1"/>
           </p:cNvSpPr>
@@ -1786,8 +1802,8 @@
         </p:nvSpPr>
         <p:spPr>
           <a:xfrm>
-            <a:off x="457200" y="1600200"/>
-            <a:ext cx="4015800" cy="4525560"/>
+            <a:off x="457200" y="1604520"/>
+            <a:ext cx="4015800" cy="3977280"/>
           </a:xfrm>
           <a:prstGeom prst="rect">
             <a:avLst/>
@@ -1802,7 +1818,7 @@
       </p:sp>
       <p:sp>
         <p:nvSpPr>
-          <p:cNvPr id="11" name="PlaceHolder 3"/>
+          <p:cNvPr id="8" name="PlaceHolder 3"/>
           <p:cNvSpPr>
             <a:spLocks noGrp="1"/>
           </p:cNvSpPr>
@@ -1812,8 +1828,8 @@
         </p:nvSpPr>
         <p:spPr>
           <a:xfrm>
-            <a:off x="4674240" y="1600200"/>
-            <a:ext cx="4015800" cy="4525560"/>
+            <a:off x="4674240" y="1604520"/>
+            <a:ext cx="4015800" cy="3977280"/>
           </a:xfrm>
           <a:prstGeom prst="rect">
             <a:avLst/>
@@ -1850,7 +1866,7 @@
       </p:grpSpPr>
       <p:sp>
         <p:nvSpPr>
-          <p:cNvPr id="12" name="PlaceHolder 1"/>
+          <p:cNvPr id="9" name="PlaceHolder 1"/>
           <p:cNvSpPr>
             <a:spLocks noGrp="1"/>
           </p:cNvSpPr>
@@ -1860,8 +1876,8 @@
         </p:nvSpPr>
         <p:spPr>
           <a:xfrm>
-            <a:off x="457200" y="274680"/>
-            <a:ext cx="8229240" cy="1142640"/>
+            <a:off x="457200" y="273600"/>
+            <a:ext cx="8229240" cy="1144800"/>
           </a:xfrm>
           <a:prstGeom prst="rect">
             <a:avLst/>
@@ -1870,6 +1886,7 @@
         <p:txBody>
           <a:bodyPr lIns="0" rIns="0" tIns="0" bIns="0" anchor="ctr"/>
           <a:p>
+            <a:pPr algn="ctr"/>
             <a:endParaRPr/>
           </a:p>
         </p:txBody>
@@ -1898,7 +1915,7 @@
       </p:grpSpPr>
       <p:sp>
         <p:nvSpPr>
-          <p:cNvPr id="13" name="PlaceHolder 1"/>
+          <p:cNvPr id="10" name="PlaceHolder 1"/>
           <p:cNvSpPr>
             <a:spLocks noGrp="1"/>
           </p:cNvSpPr>
@@ -1908,8 +1925,8 @@
         </p:nvSpPr>
         <p:spPr>
           <a:xfrm>
-            <a:off x="457200" y="274680"/>
-            <a:ext cx="8229240" cy="5297760"/>
+            <a:off x="457200" y="273600"/>
+            <a:ext cx="8229240" cy="5307840"/>
           </a:xfrm>
           <a:prstGeom prst="rect">
             <a:avLst/>
@@ -1947,7 +1964,7 @@
       </p:grpSpPr>
       <p:sp>
         <p:nvSpPr>
-          <p:cNvPr id="14" name="PlaceHolder 1"/>
+          <p:cNvPr id="11" name="PlaceHolder 1"/>
           <p:cNvSpPr>
             <a:spLocks noGrp="1"/>
           </p:cNvSpPr>
@@ -1957,8 +1974,8 @@
         </p:nvSpPr>
         <p:spPr>
           <a:xfrm>
-            <a:off x="457200" y="274680"/>
-            <a:ext cx="8229240" cy="1142640"/>
+            <a:off x="457200" y="273600"/>
+            <a:ext cx="8229240" cy="1144800"/>
           </a:xfrm>
           <a:prstGeom prst="rect">
             <a:avLst/>
@@ -1967,13 +1984,14 @@
         <p:txBody>
           <a:bodyPr lIns="0" rIns="0" tIns="0" bIns="0" anchor="ctr"/>
           <a:p>
-            <a:endParaRPr/>
-          </a:p>
-        </p:txBody>
-      </p:sp>
-      <p:sp>
-        <p:nvSpPr>
-          <p:cNvPr id="15" name="PlaceHolder 2"/>
+            <a:pPr algn="ctr"/>
+            <a:endParaRPr/>
+          </a:p>
+        </p:txBody>
+      </p:sp>
+      <p:sp>
+        <p:nvSpPr>
+          <p:cNvPr id="12" name="PlaceHolder 2"/>
           <p:cNvSpPr>
             <a:spLocks noGrp="1"/>
           </p:cNvSpPr>
@@ -1983,8 +2001,8 @@
         </p:nvSpPr>
         <p:spPr>
           <a:xfrm>
-            <a:off x="457200" y="1600200"/>
-            <a:ext cx="4015800" cy="2158560"/>
+            <a:off x="457200" y="1604520"/>
+            <a:ext cx="4015800" cy="1896840"/>
           </a:xfrm>
           <a:prstGeom prst="rect">
             <a:avLst/>
@@ -1999,7 +2017,7 @@
       </p:sp>
       <p:sp>
         <p:nvSpPr>
-          <p:cNvPr id="16" name="PlaceHolder 3"/>
+          <p:cNvPr id="13" name="PlaceHolder 3"/>
           <p:cNvSpPr>
             <a:spLocks noGrp="1"/>
           </p:cNvSpPr>
@@ -2009,8 +2027,8 @@
         </p:nvSpPr>
         <p:spPr>
           <a:xfrm>
-            <a:off x="457200" y="3964320"/>
-            <a:ext cx="4015800" cy="2158560"/>
+            <a:off x="457200" y="3682080"/>
+            <a:ext cx="4015800" cy="1896840"/>
           </a:xfrm>
           <a:prstGeom prst="rect">
             <a:avLst/>
@@ -2025,7 +2043,7 @@
       </p:sp>
       <p:sp>
         <p:nvSpPr>
-          <p:cNvPr id="17" name="PlaceHolder 4"/>
+          <p:cNvPr id="14" name="PlaceHolder 4"/>
           <p:cNvSpPr>
             <a:spLocks noGrp="1"/>
           </p:cNvSpPr>
@@ -2035,8 +2053,8 @@
         </p:nvSpPr>
         <p:spPr>
           <a:xfrm>
-            <a:off x="4674240" y="1600200"/>
-            <a:ext cx="4015800" cy="4525560"/>
+            <a:off x="4674240" y="1604520"/>
+            <a:ext cx="4015800" cy="3977280"/>
           </a:xfrm>
           <a:prstGeom prst="rect">
             <a:avLst/>
@@ -2073,7 +2091,7 @@
       </p:grpSpPr>
       <p:sp>
         <p:nvSpPr>
-          <p:cNvPr id="18" name="PlaceHolder 1"/>
+          <p:cNvPr id="15" name="PlaceHolder 1"/>
           <p:cNvSpPr>
             <a:spLocks noGrp="1"/>
           </p:cNvSpPr>
@@ -2083,8 +2101,8 @@
         </p:nvSpPr>
         <p:spPr>
           <a:xfrm>
-            <a:off x="457200" y="274680"/>
-            <a:ext cx="8229240" cy="1142640"/>
+            <a:off x="457200" y="273600"/>
+            <a:ext cx="8229240" cy="1144800"/>
           </a:xfrm>
           <a:prstGeom prst="rect">
             <a:avLst/>
@@ -2093,13 +2111,14 @@
         <p:txBody>
           <a:bodyPr lIns="0" rIns="0" tIns="0" bIns="0" anchor="ctr"/>
           <a:p>
-            <a:endParaRPr/>
-          </a:p>
-        </p:txBody>
-      </p:sp>
-      <p:sp>
-        <p:nvSpPr>
-          <p:cNvPr id="19" name="PlaceHolder 2"/>
+            <a:pPr algn="ctr"/>
+            <a:endParaRPr/>
+          </a:p>
+        </p:txBody>
+      </p:sp>
+      <p:sp>
+        <p:nvSpPr>
+          <p:cNvPr id="16" name="PlaceHolder 2"/>
           <p:cNvSpPr>
             <a:spLocks noGrp="1"/>
           </p:cNvSpPr>
@@ -2109,8 +2128,8 @@
         </p:nvSpPr>
         <p:spPr>
           <a:xfrm>
-            <a:off x="457200" y="1600200"/>
-            <a:ext cx="4015800" cy="4525560"/>
+            <a:off x="457200" y="1604520"/>
+            <a:ext cx="4015800" cy="3977280"/>
           </a:xfrm>
           <a:prstGeom prst="rect">
             <a:avLst/>
@@ -2125,7 +2144,7 @@
       </p:sp>
       <p:sp>
         <p:nvSpPr>
-          <p:cNvPr id="20" name="PlaceHolder 3"/>
+          <p:cNvPr id="17" name="PlaceHolder 3"/>
           <p:cNvSpPr>
             <a:spLocks noGrp="1"/>
           </p:cNvSpPr>
@@ -2135,8 +2154,8 @@
         </p:nvSpPr>
         <p:spPr>
           <a:xfrm>
-            <a:off x="4674240" y="1600200"/>
-            <a:ext cx="4015800" cy="2158560"/>
+            <a:off x="4674240" y="1604520"/>
+            <a:ext cx="4015800" cy="1896840"/>
           </a:xfrm>
           <a:prstGeom prst="rect">
             <a:avLst/>
@@ -2151,7 +2170,7 @@
       </p:sp>
       <p:sp>
         <p:nvSpPr>
-          <p:cNvPr id="21" name="PlaceHolder 4"/>
+          <p:cNvPr id="18" name="PlaceHolder 4"/>
           <p:cNvSpPr>
             <a:spLocks noGrp="1"/>
           </p:cNvSpPr>
@@ -2161,8 +2180,8 @@
         </p:nvSpPr>
         <p:spPr>
           <a:xfrm>
-            <a:off x="4674240" y="3964320"/>
-            <a:ext cx="4015800" cy="2158560"/>
+            <a:off x="4674240" y="3682080"/>
+            <a:ext cx="4015800" cy="1896840"/>
           </a:xfrm>
           <a:prstGeom prst="rect">
             <a:avLst/>
@@ -2199,7 +2218,7 @@
       </p:grpSpPr>
       <p:sp>
         <p:nvSpPr>
-          <p:cNvPr id="22" name="PlaceHolder 1"/>
+          <p:cNvPr id="19" name="PlaceHolder 1"/>
           <p:cNvSpPr>
             <a:spLocks noGrp="1"/>
           </p:cNvSpPr>
@@ -2209,8 +2228,8 @@
         </p:nvSpPr>
         <p:spPr>
           <a:xfrm>
-            <a:off x="457200" y="274680"/>
-            <a:ext cx="8229240" cy="1142640"/>
+            <a:off x="457200" y="273600"/>
+            <a:ext cx="8229240" cy="1144800"/>
           </a:xfrm>
           <a:prstGeom prst="rect">
             <a:avLst/>
@@ -2219,13 +2238,14 @@
         <p:txBody>
           <a:bodyPr lIns="0" rIns="0" tIns="0" bIns="0" anchor="ctr"/>
           <a:p>
-            <a:endParaRPr/>
-          </a:p>
-        </p:txBody>
-      </p:sp>
-      <p:sp>
-        <p:nvSpPr>
-          <p:cNvPr id="23" name="PlaceHolder 2"/>
+            <a:pPr algn="ctr"/>
+            <a:endParaRPr/>
+          </a:p>
+        </p:txBody>
+      </p:sp>
+      <p:sp>
+        <p:nvSpPr>
+          <p:cNvPr id="20" name="PlaceHolder 2"/>
           <p:cNvSpPr>
             <a:spLocks noGrp="1"/>
           </p:cNvSpPr>
@@ -2235,8 +2255,8 @@
         </p:nvSpPr>
         <p:spPr>
           <a:xfrm>
-            <a:off x="457200" y="1600200"/>
-            <a:ext cx="4015800" cy="2158560"/>
+            <a:off x="457200" y="1604520"/>
+            <a:ext cx="4015800" cy="1896840"/>
           </a:xfrm>
           <a:prstGeom prst="rect">
             <a:avLst/>
@@ -2251,7 +2271,7 @@
       </p:sp>
       <p:sp>
         <p:nvSpPr>
-          <p:cNvPr id="24" name="PlaceHolder 3"/>
+          <p:cNvPr id="21" name="PlaceHolder 3"/>
           <p:cNvSpPr>
             <a:spLocks noGrp="1"/>
           </p:cNvSpPr>
@@ -2261,8 +2281,8 @@
         </p:nvSpPr>
         <p:spPr>
           <a:xfrm>
-            <a:off x="4674240" y="1600200"/>
-            <a:ext cx="4015800" cy="2158560"/>
+            <a:off x="4674240" y="1604520"/>
+            <a:ext cx="4015800" cy="1896840"/>
           </a:xfrm>
           <a:prstGeom prst="rect">
             <a:avLst/>
@@ -2277,7 +2297,7 @@
       </p:sp>
       <p:sp>
         <p:nvSpPr>
-          <p:cNvPr id="25" name="PlaceHolder 4"/>
+          <p:cNvPr id="22" name="PlaceHolder 4"/>
           <p:cNvSpPr>
             <a:spLocks noGrp="1"/>
           </p:cNvSpPr>
@@ -2287,8 +2307,8 @@
         </p:nvSpPr>
         <p:spPr>
           <a:xfrm>
-            <a:off x="457200" y="3964320"/>
-            <a:ext cx="8229240" cy="2158560"/>
+            <a:off x="457200" y="3682080"/>
+            <a:ext cx="8229240" cy="1896840"/>
           </a:xfrm>
           <a:prstGeom prst="rect">
             <a:avLst/>
@@ -2345,29 +2365,21 @@
         </p:nvSpPr>
         <p:spPr>
           <a:xfrm>
-            <a:off x="685800" y="2130480"/>
-            <a:ext cx="7772040" cy="1469520"/>
-          </a:xfrm>
-          <a:prstGeom prst="rect">
-            <a:avLst/>
-          </a:prstGeom>
-        </p:spPr>
-        <p:txBody>
-          <a:bodyPr anchor="ctr"/>
-          <a:p>
-            <a:pPr algn="ctr">
-              <a:lnSpc>
-                <a:spcPct val="100000"/>
-              </a:lnSpc>
-            </a:pPr>
-            <a:r>
-              <a:rPr lang="bg-BG" sz="4400" strike="noStrike">
-                <a:solidFill>
-                  <a:srgbClr val="000000"/>
-                </a:solidFill>
-                <a:latin typeface="Calibri"/>
-              </a:rPr>
-              <a:t>Click to edit the title text formatClick to edit Master title style</a:t>
+            <a:off x="457200" y="274680"/>
+            <a:ext cx="8228880" cy="1142280"/>
+          </a:xfrm>
+          <a:prstGeom prst="rect">
+            <a:avLst/>
+          </a:prstGeom>
+        </p:spPr>
+        <p:txBody>
+          <a:bodyPr lIns="0" rIns="0" tIns="0" bIns="0" anchor="ctr"/>
+          <a:p>
+            <a:r>
+              <a:rPr lang="en-US">
+                <a:latin typeface="Arial"/>
+              </a:rPr>
+              <a:t>Click to edit the title text format</a:t>
             </a:r>
             <a:endParaRPr/>
           </a:p>
@@ -2376,112 +2388,6 @@
       <p:sp>
         <p:nvSpPr>
           <p:cNvPr id="1" name="PlaceHolder 2"/>
-          <p:cNvSpPr>
-            <a:spLocks noGrp="1"/>
-          </p:cNvSpPr>
-          <p:nvPr>
-            <p:ph type="dt"/>
-          </p:nvPr>
-        </p:nvSpPr>
-        <p:spPr>
-          <a:xfrm>
-            <a:off x="457200" y="6356520"/>
-            <a:ext cx="2133360" cy="364680"/>
-          </a:xfrm>
-          <a:prstGeom prst="rect">
-            <a:avLst/>
-          </a:prstGeom>
-        </p:spPr>
-        <p:txBody>
-          <a:bodyPr anchor="ctr"/>
-          <a:p>
-            <a:pPr>
-              <a:lnSpc>
-                <a:spcPct val="100000"/>
-              </a:lnSpc>
-            </a:pPr>
-            <a:r>
-              <a:rPr lang="en-US" sz="1200" strike="noStrike">
-                <a:solidFill>
-                  <a:srgbClr val="8b8b8b"/>
-                </a:solidFill>
-                <a:latin typeface="Calibri"/>
-              </a:rPr>
-              <a:t>4/27/15</a:t>
-            </a:r>
-            <a:endParaRPr/>
-          </a:p>
-        </p:txBody>
-      </p:sp>
-      <p:sp>
-        <p:nvSpPr>
-          <p:cNvPr id="2" name="PlaceHolder 3"/>
-          <p:cNvSpPr>
-            <a:spLocks noGrp="1"/>
-          </p:cNvSpPr>
-          <p:nvPr>
-            <p:ph type="ftr"/>
-          </p:nvPr>
-        </p:nvSpPr>
-        <p:spPr>
-          <a:xfrm>
-            <a:off x="3124080" y="6356520"/>
-            <a:ext cx="2895120" cy="364680"/>
-          </a:xfrm>
-          <a:prstGeom prst="rect">
-            <a:avLst/>
-          </a:prstGeom>
-        </p:spPr>
-        <p:txBody>
-          <a:bodyPr anchor="ctr"/>
-          <a:p>
-            <a:endParaRPr/>
-          </a:p>
-        </p:txBody>
-      </p:sp>
-      <p:sp>
-        <p:nvSpPr>
-          <p:cNvPr id="3" name="PlaceHolder 4"/>
-          <p:cNvSpPr>
-            <a:spLocks noGrp="1"/>
-          </p:cNvSpPr>
-          <p:nvPr>
-            <p:ph type="sldNum"/>
-          </p:nvPr>
-        </p:nvSpPr>
-        <p:spPr>
-          <a:xfrm>
-            <a:off x="6553080" y="6356520"/>
-            <a:ext cx="2133360" cy="364680"/>
-          </a:xfrm>
-          <a:prstGeom prst="rect">
-            <a:avLst/>
-          </a:prstGeom>
-        </p:spPr>
-        <p:txBody>
-          <a:bodyPr anchor="ctr"/>
-          <a:p>
-            <a:pPr algn="r">
-              <a:lnSpc>
-                <a:spcPct val="100000"/>
-              </a:lnSpc>
-            </a:pPr>
-            <a:fld id="{E6C17E94-8086-4AF6-A27E-F693ABF2CBCB}" type="slidenum">
-              <a:rPr lang="en-US" sz="1200" strike="noStrike">
-                <a:solidFill>
-                  <a:srgbClr val="8b8b8b"/>
-                </a:solidFill>
-                <a:latin typeface="Calibri"/>
-              </a:rPr>
-              <a:t>&lt;number&gt;</a:t>
-            </a:fld>
-            <a:endParaRPr/>
-          </a:p>
-        </p:txBody>
-      </p:sp>
-      <p:sp>
-        <p:nvSpPr>
-          <p:cNvPr id="4" name="PlaceHolder 5"/>
           <p:cNvSpPr>
             <a:spLocks noGrp="1"/>
           </p:cNvSpPr>
@@ -2507,8 +2413,8 @@
               <a:buChar char=""/>
             </a:pPr>
             <a:r>
-              <a:rPr lang="bg-BG" sz="3200">
-                <a:latin typeface="Calibri"/>
+              <a:rPr lang="en-US" sz="3200">
+                <a:latin typeface="Arial"/>
               </a:rPr>
               <a:t>Click to edit the outline text format</a:t>
             </a:r>
@@ -2521,8 +2427,8 @@
               <a:buChar char=""/>
             </a:pPr>
             <a:r>
-              <a:rPr lang="bg-BG" sz="2400">
-                <a:latin typeface="Calibri"/>
+              <a:rPr lang="en-US" sz="2800">
+                <a:latin typeface="Arial"/>
               </a:rPr>
               <a:t>Second Outline Level</a:t>
             </a:r>
@@ -2535,8 +2441,8 @@
               <a:buChar char=""/>
             </a:pPr>
             <a:r>
-              <a:rPr lang="bg-BG" sz="2000">
-                <a:latin typeface="Calibri"/>
+              <a:rPr lang="en-US" sz="2400">
+                <a:latin typeface="Arial"/>
               </a:rPr>
               <a:t>Third Outline Level</a:t>
             </a:r>
@@ -2549,8 +2455,8 @@
               <a:buChar char=""/>
             </a:pPr>
             <a:r>
-              <a:rPr lang="bg-BG" sz="2000">
-                <a:latin typeface="Calibri"/>
+              <a:rPr lang="en-US" sz="2000">
+                <a:latin typeface="Arial"/>
               </a:rPr>
               <a:t>Fourth Outline Level</a:t>
             </a:r>
@@ -2563,8 +2469,8 @@
               <a:buChar char=""/>
             </a:pPr>
             <a:r>
-              <a:rPr lang="bg-BG" sz="2000">
-                <a:latin typeface="Calibri"/>
+              <a:rPr lang="en-US" sz="2000">
+                <a:latin typeface="Arial"/>
               </a:rPr>
               <a:t>Fifth Outline Level</a:t>
             </a:r>
@@ -2577,8 +2483,8 @@
               <a:buChar char=""/>
             </a:pPr>
             <a:r>
-              <a:rPr lang="bg-BG" sz="2000">
-                <a:latin typeface="Calibri"/>
+              <a:rPr lang="en-US" sz="2000">
+                <a:latin typeface="Arial"/>
               </a:rPr>
               <a:t>Sixth Outline Level</a:t>
             </a:r>
@@ -2591,8 +2497,8 @@
               <a:buChar char=""/>
             </a:pPr>
             <a:r>
-              <a:rPr lang="bg-BG" sz="2000">
-                <a:latin typeface="Calibri"/>
+              <a:rPr lang="en-US" sz="2000">
+                <a:latin typeface="Arial"/>
               </a:rPr>
               <a:t>Seventh Outline Level</a:t>
             </a:r>
@@ -2649,7 +2555,7 @@
       </p:grpSpPr>
       <p:sp>
         <p:nvSpPr>
-          <p:cNvPr id="39" name="PlaceHolder 1"/>
+          <p:cNvPr id="36" name="PlaceHolder 1"/>
           <p:cNvSpPr>
             <a:spLocks noGrp="1"/>
           </p:cNvSpPr>
@@ -2659,37 +2565,30 @@
         </p:nvSpPr>
         <p:spPr>
           <a:xfrm>
-            <a:off x="457200" y="274680"/>
-            <a:ext cx="8229240" cy="1142640"/>
-          </a:xfrm>
-          <a:prstGeom prst="rect">
-            <a:avLst/>
-          </a:prstGeom>
-        </p:spPr>
-        <p:txBody>
-          <a:bodyPr anchor="ctr"/>
-          <a:p>
-            <a:pPr algn="ctr">
-              <a:lnSpc>
-                <a:spcPct val="100000"/>
-              </a:lnSpc>
-            </a:pPr>
-            <a:r>
-              <a:rPr lang="bg-BG" sz="4400" strike="noStrike">
-                <a:solidFill>
-                  <a:srgbClr val="000000"/>
-                </a:solidFill>
-                <a:latin typeface="Calibri"/>
-              </a:rPr>
-              <a:t>Click to edit the title text formatClick to edit Master title style</a:t>
-            </a:r>
-            <a:endParaRPr/>
-          </a:p>
-        </p:txBody>
-      </p:sp>
-      <p:sp>
-        <p:nvSpPr>
-          <p:cNvPr id="40" name="PlaceHolder 2"/>
+            <a:off x="457200" y="273600"/>
+            <a:ext cx="8229240" cy="1144800"/>
+          </a:xfrm>
+          <a:prstGeom prst="rect">
+            <a:avLst/>
+          </a:prstGeom>
+        </p:spPr>
+        <p:txBody>
+          <a:bodyPr lIns="0" rIns="0" tIns="0" bIns="0" anchor="ctr"/>
+          <a:p>
+            <a:pPr algn="ctr"/>
+            <a:r>
+              <a:rPr lang="en-US" sz="4400">
+                <a:latin typeface="Arial"/>
+              </a:rPr>
+              <a:t>Click to edit the title text format</a:t>
+            </a:r>
+            <a:endParaRPr/>
+          </a:p>
+        </p:txBody>
+      </p:sp>
+      <p:sp>
+        <p:nvSpPr>
+          <p:cNvPr id="37" name="PlaceHolder 2"/>
           <p:cNvSpPr>
             <a:spLocks noGrp="1"/>
           </p:cNvSpPr>
@@ -2699,15 +2598,15 @@
         </p:nvSpPr>
         <p:spPr>
           <a:xfrm>
-            <a:off x="457200" y="1600200"/>
-            <a:ext cx="8229240" cy="4525560"/>
-          </a:xfrm>
-          <a:prstGeom prst="rect">
-            <a:avLst/>
-          </a:prstGeom>
-        </p:spPr>
-        <p:txBody>
-          <a:bodyPr/>
+            <a:off x="457200" y="1604520"/>
+            <a:ext cx="8229240" cy="3977280"/>
+          </a:xfrm>
+          <a:prstGeom prst="rect">
+            <a:avLst/>
+          </a:prstGeom>
+        </p:spPr>
+        <p:txBody>
+          <a:bodyPr lIns="0" rIns="0" tIns="0" bIns="0"/>
           <a:p>
             <a:pPr>
               <a:buSzPct val="45000"/>
@@ -2715,11 +2614,8 @@
               <a:buChar char=""/>
             </a:pPr>
             <a:r>
-              <a:rPr lang="bg-BG" sz="3200" strike="noStrike">
-                <a:solidFill>
-                  <a:srgbClr val="000000"/>
-                </a:solidFill>
-                <a:latin typeface="Calibri"/>
+              <a:rPr lang="en-US" sz="3200">
+                <a:latin typeface="Arial"/>
               </a:rPr>
               <a:t>Click to edit the outline text format</a:t>
             </a:r>
@@ -2732,11 +2628,8 @@
               <a:buChar char=""/>
             </a:pPr>
             <a:r>
-              <a:rPr lang="bg-BG" sz="3200" strike="noStrike">
-                <a:solidFill>
-                  <a:srgbClr val="000000"/>
-                </a:solidFill>
-                <a:latin typeface="Calibri"/>
+              <a:rPr lang="en-US" sz="2800">
+                <a:latin typeface="Arial"/>
               </a:rPr>
               <a:t>Second Outline Level</a:t>
             </a:r>
@@ -2749,11 +2642,8 @@
               <a:buChar char=""/>
             </a:pPr>
             <a:r>
-              <a:rPr lang="bg-BG" sz="3200" strike="noStrike">
-                <a:solidFill>
-                  <a:srgbClr val="000000"/>
-                </a:solidFill>
-                <a:latin typeface="Calibri"/>
+              <a:rPr lang="en-US" sz="2400">
+                <a:latin typeface="Arial"/>
               </a:rPr>
               <a:t>Third Outline Level</a:t>
             </a:r>
@@ -2766,11 +2656,8 @@
               <a:buChar char=""/>
             </a:pPr>
             <a:r>
-              <a:rPr lang="bg-BG" sz="3200" strike="noStrike">
-                <a:solidFill>
-                  <a:srgbClr val="000000"/>
-                </a:solidFill>
-                <a:latin typeface="Calibri"/>
+              <a:rPr lang="en-US" sz="2000">
+                <a:latin typeface="Arial"/>
               </a:rPr>
               <a:t>Fourth Outline Level</a:t>
             </a:r>
@@ -2783,11 +2670,8 @@
               <a:buChar char=""/>
             </a:pPr>
             <a:r>
-              <a:rPr lang="bg-BG" sz="3200" strike="noStrike">
-                <a:solidFill>
-                  <a:srgbClr val="000000"/>
-                </a:solidFill>
-                <a:latin typeface="Calibri"/>
+              <a:rPr lang="en-US" sz="2000">
+                <a:latin typeface="Arial"/>
               </a:rPr>
               <a:t>Fifth Outline Level</a:t>
             </a:r>
@@ -2800,215 +2684,25 @@
               <a:buChar char=""/>
             </a:pPr>
             <a:r>
-              <a:rPr lang="bg-BG" sz="3200" strike="noStrike">
-                <a:solidFill>
-                  <a:srgbClr val="000000"/>
-                </a:solidFill>
-                <a:latin typeface="Calibri"/>
+              <a:rPr lang="en-US" sz="2000">
+                <a:latin typeface="Arial"/>
               </a:rPr>
               <a:t>Sixth Outline Level</a:t>
             </a:r>
             <a:endParaRPr/>
           </a:p>
           <a:p>
-            <a:pPr>
-              <a:lnSpc>
-                <a:spcPct val="100000"/>
-              </a:lnSpc>
-              <a:buFont typeface="Arial"/>
-              <a:buChar char="•"/>
-            </a:pPr>
-            <a:r>
-              <a:rPr lang="bg-BG" sz="3200" strike="noStrike">
-                <a:solidFill>
-                  <a:srgbClr val="000000"/>
-                </a:solidFill>
-                <a:latin typeface="Calibri"/>
-              </a:rPr>
-              <a:t>Seventh Outline LevelClick to edit Master text styles</a:t>
-            </a:r>
-            <a:endParaRPr/>
-          </a:p>
-          <a:p>
-            <a:pPr lvl="1">
-              <a:lnSpc>
-                <a:spcPct val="100000"/>
-              </a:lnSpc>
-              <a:buFont typeface="Arial"/>
-              <a:buChar char="–"/>
-            </a:pPr>
-            <a:r>
-              <a:rPr lang="bg-BG" sz="2800" strike="noStrike">
-                <a:solidFill>
-                  <a:srgbClr val="000000"/>
-                </a:solidFill>
-                <a:latin typeface="Calibri"/>
-              </a:rPr>
-              <a:t>Second level</a:t>
-            </a:r>
-            <a:endParaRPr/>
-          </a:p>
-          <a:p>
-            <a:pPr lvl="2">
-              <a:lnSpc>
-                <a:spcPct val="100000"/>
-              </a:lnSpc>
-              <a:buFont typeface="Arial"/>
-              <a:buChar char="•"/>
-            </a:pPr>
-            <a:r>
-              <a:rPr lang="bg-BG" sz="2400" strike="noStrike">
-                <a:solidFill>
-                  <a:srgbClr val="000000"/>
-                </a:solidFill>
-                <a:latin typeface="Calibri"/>
-              </a:rPr>
-              <a:t>Third level</a:t>
-            </a:r>
-            <a:endParaRPr/>
-          </a:p>
-          <a:p>
-            <a:pPr lvl="3">
-              <a:lnSpc>
-                <a:spcPct val="100000"/>
-              </a:lnSpc>
-              <a:buFont typeface="Arial"/>
-              <a:buChar char="–"/>
-            </a:pPr>
-            <a:r>
-              <a:rPr lang="bg-BG" sz="2000" strike="noStrike">
-                <a:solidFill>
-                  <a:srgbClr val="000000"/>
-                </a:solidFill>
-                <a:latin typeface="Calibri"/>
-              </a:rPr>
-              <a:t>Fourth level</a:t>
-            </a:r>
-            <a:endParaRPr/>
-          </a:p>
-          <a:p>
-            <a:pPr lvl="4">
-              <a:lnSpc>
-                <a:spcPct val="100000"/>
-              </a:lnSpc>
-              <a:buFont typeface="Arial"/>
-              <a:buChar char="»"/>
-            </a:pPr>
-            <a:r>
-              <a:rPr lang="bg-BG" sz="2000" strike="noStrike">
-                <a:solidFill>
-                  <a:srgbClr val="000000"/>
-                </a:solidFill>
-                <a:latin typeface="Calibri"/>
-              </a:rPr>
-              <a:t>Fifth level</a:t>
-            </a:r>
-            <a:endParaRPr/>
-          </a:p>
-        </p:txBody>
-      </p:sp>
-      <p:sp>
-        <p:nvSpPr>
-          <p:cNvPr id="41" name="PlaceHolder 3"/>
-          <p:cNvSpPr>
-            <a:spLocks noGrp="1"/>
-          </p:cNvSpPr>
-          <p:nvPr>
-            <p:ph type="dt"/>
-          </p:nvPr>
-        </p:nvSpPr>
-        <p:spPr>
-          <a:xfrm>
-            <a:off x="457200" y="6356520"/>
-            <a:ext cx="2133360" cy="364680"/>
-          </a:xfrm>
-          <a:prstGeom prst="rect">
-            <a:avLst/>
-          </a:prstGeom>
-        </p:spPr>
-        <p:txBody>
-          <a:bodyPr anchor="ctr"/>
-          <a:p>
-            <a:pPr>
-              <a:lnSpc>
-                <a:spcPct val="100000"/>
-              </a:lnSpc>
-            </a:pPr>
-            <a:r>
-              <a:rPr lang="en-US" sz="1200" strike="noStrike">
-                <a:solidFill>
-                  <a:srgbClr val="8b8b8b"/>
-                </a:solidFill>
-                <a:latin typeface="Calibri"/>
-              </a:rPr>
-              <a:t>4/27/15</a:t>
-            </a:r>
-            <a:endParaRPr/>
-          </a:p>
-        </p:txBody>
-      </p:sp>
-      <p:sp>
-        <p:nvSpPr>
-          <p:cNvPr id="42" name="PlaceHolder 4"/>
-          <p:cNvSpPr>
-            <a:spLocks noGrp="1"/>
-          </p:cNvSpPr>
-          <p:nvPr>
-            <p:ph type="ftr"/>
-          </p:nvPr>
-        </p:nvSpPr>
-        <p:spPr>
-          <a:xfrm>
-            <a:off x="3124080" y="6356520"/>
-            <a:ext cx="2895120" cy="364680"/>
-          </a:xfrm>
-          <a:prstGeom prst="rect">
-            <a:avLst/>
-          </a:prstGeom>
-        </p:spPr>
-        <p:txBody>
-          <a:bodyPr anchor="ctr"/>
-          <a:p>
-            <a:endParaRPr/>
-          </a:p>
-        </p:txBody>
-      </p:sp>
-      <p:sp>
-        <p:nvSpPr>
-          <p:cNvPr id="43" name="PlaceHolder 5"/>
-          <p:cNvSpPr>
-            <a:spLocks noGrp="1"/>
-          </p:cNvSpPr>
-          <p:nvPr>
-            <p:ph type="sldNum"/>
-          </p:nvPr>
-        </p:nvSpPr>
-        <p:spPr>
-          <a:xfrm>
-            <a:off x="6553080" y="6356520"/>
-            <a:ext cx="2133360" cy="364680"/>
-          </a:xfrm>
-          <a:prstGeom prst="rect">
-            <a:avLst/>
-          </a:prstGeom>
-        </p:spPr>
-        <p:txBody>
-          <a:bodyPr anchor="ctr"/>
-          <a:p>
-            <a:pPr algn="r">
-              <a:lnSpc>
-                <a:spcPct val="100000"/>
-              </a:lnSpc>
-            </a:pPr>
-            <a:fld id="{73DA0E06-8DF3-4F2E-AD35-2544371A8B5F}" type="slidenum">
-              <a:rPr lang="en-US" sz="1200" strike="noStrike">
-                <a:solidFill>
-                  <a:srgbClr val="8b8b8b"/>
-                </a:solidFill>
-                <a:latin typeface="Calibri"/>
-              </a:rPr>
-              <a:t>&lt;number&gt;</a:t>
-            </a:fld>
+            <a:pPr lvl="6">
+              <a:buSzPct val="45000"/>
+              <a:buFont typeface="StarSymbol"/>
+              <a:buChar char=""/>
+            </a:pPr>
+            <a:r>
+              <a:rPr lang="en-US" sz="2000">
+                <a:latin typeface="Arial"/>
+              </a:rPr>
+              <a:t>Seventh Outline Level</a:t>
+            </a:r>
             <a:endParaRPr/>
           </a:p>
         </p:txBody>
@@ -3052,14 +2746,14 @@
       </p:grpSpPr>
       <p:sp>
         <p:nvSpPr>
-          <p:cNvPr id="78" name="TextShape 1"/>
-          <p:cNvSpPr txBox="1"/>
+          <p:cNvPr id="72" name="CustomShape 1"/>
+          <p:cNvSpPr/>
           <p:nvPr/>
         </p:nvSpPr>
         <p:spPr>
           <a:xfrm>
             <a:off x="685800" y="2130480"/>
-            <a:ext cx="7772040" cy="1469520"/>
+            <a:ext cx="7771680" cy="1469160"/>
           </a:xfrm>
           <a:prstGeom prst="rect">
             <a:avLst/>
@@ -3069,8 +2763,14 @@
             <a:noFill/>
           </a:ln>
         </p:spPr>
-        <p:txBody>
-          <a:bodyPr anchor="ctr"/>
+        <p:style>
+          <a:lnRef idx="0"/>
+          <a:fillRef idx="0"/>
+          <a:effectRef idx="0"/>
+          <a:fontRef idx="minor"/>
+        </p:style>
+        <p:txBody>
+          <a:bodyPr lIns="90000" rIns="90000" tIns="45000" bIns="45000" anchor="ctr"/>
           <a:p>
             <a:pPr algn="ctr">
               <a:lnSpc>
@@ -3078,7 +2778,7 @@
               </a:lnSpc>
             </a:pPr>
             <a:r>
-              <a:rPr lang="bg-BG" sz="4400" strike="noStrike">
+              <a:rPr lang="en-US" sz="4400" strike="noStrike">
                 <a:solidFill>
                   <a:srgbClr val="f79646"/>
                 </a:solidFill>
@@ -3092,14 +2792,14 @@
       </p:sp>
       <p:sp>
         <p:nvSpPr>
-          <p:cNvPr id="79" name="TextShape 2"/>
-          <p:cNvSpPr txBox="1"/>
+          <p:cNvPr id="73" name="CustomShape 2"/>
+          <p:cNvSpPr/>
           <p:nvPr/>
         </p:nvSpPr>
         <p:spPr>
           <a:xfrm>
             <a:off x="1371600" y="3886200"/>
-            <a:ext cx="6400440" cy="1752120"/>
+            <a:ext cx="6400080" cy="1751760"/>
           </a:xfrm>
           <a:prstGeom prst="rect">
             <a:avLst/>
@@ -3109,8 +2809,14 @@
             <a:noFill/>
           </a:ln>
         </p:spPr>
-        <p:txBody>
-          <a:bodyPr/>
+        <p:style>
+          <a:lnRef idx="0"/>
+          <a:fillRef idx="0"/>
+          <a:effectRef idx="0"/>
+          <a:fontRef idx="minor"/>
+        </p:style>
+        <p:txBody>
+          <a:bodyPr lIns="90000" rIns="90000" tIns="45000" bIns="45000"/>
           <a:p>
             <a:pPr algn="ctr">
               <a:lnSpc>
@@ -3189,14 +2895,14 @@
       </p:grpSpPr>
       <p:sp>
         <p:nvSpPr>
-          <p:cNvPr id="80" name="TextShape 1"/>
-          <p:cNvSpPr txBox="1"/>
+          <p:cNvPr id="74" name="CustomShape 1"/>
+          <p:cNvSpPr/>
           <p:nvPr/>
         </p:nvSpPr>
         <p:spPr>
           <a:xfrm>
             <a:off x="838080" y="685800"/>
-            <a:ext cx="8229240" cy="1142640"/>
+            <a:ext cx="8228880" cy="1142280"/>
           </a:xfrm>
           <a:prstGeom prst="rect">
             <a:avLst/>
@@ -3206,8 +2912,14 @@
             <a:noFill/>
           </a:ln>
         </p:spPr>
-        <p:txBody>
-          <a:bodyPr anchor="ctr"/>
+        <p:style>
+          <a:lnRef idx="0"/>
+          <a:fillRef idx="0"/>
+          <a:effectRef idx="0"/>
+          <a:fontRef idx="minor"/>
+        </p:style>
+        <p:txBody>
+          <a:bodyPr lIns="90000" rIns="90000" tIns="45000" bIns="45000" anchor="ctr"/>
           <a:p>
             <a:pPr>
               <a:lnSpc>
@@ -3215,7 +2927,7 @@
               </a:lnSpc>
             </a:pPr>
             <a:r>
-              <a:rPr lang="bg-BG" sz="4400" strike="noStrike">
+              <a:rPr lang="en-US" sz="4400" strike="noStrike">
                 <a:solidFill>
                   <a:srgbClr val="f79646"/>
                 </a:solidFill>
@@ -3229,14 +2941,14 @@
       </p:sp>
       <p:sp>
         <p:nvSpPr>
-          <p:cNvPr id="81" name="TextShape 2"/>
-          <p:cNvSpPr txBox="1"/>
+          <p:cNvPr id="75" name="CustomShape 2"/>
+          <p:cNvSpPr/>
           <p:nvPr/>
         </p:nvSpPr>
         <p:spPr>
           <a:xfrm>
             <a:off x="762120" y="1676520"/>
-            <a:ext cx="7848360" cy="4525560"/>
+            <a:ext cx="7848000" cy="4525200"/>
           </a:xfrm>
           <a:prstGeom prst="rect">
             <a:avLst/>
@@ -3246,8 +2958,14 @@
             <a:noFill/>
           </a:ln>
         </p:spPr>
-        <p:txBody>
-          <a:bodyPr/>
+        <p:style>
+          <a:lnRef idx="0"/>
+          <a:fillRef idx="0"/>
+          <a:effectRef idx="0"/>
+          <a:fontRef idx="minor"/>
+        </p:style>
+        <p:txBody>
+          <a:bodyPr lIns="90000" rIns="90000" tIns="45000" bIns="45000"/>
           <a:p>
             <a:pPr>
               <a:lnSpc>
@@ -3257,7 +2975,7 @@
               <a:buChar char=""/>
             </a:pPr>
             <a:r>
-              <a:rPr lang="bg-BG" sz="3200" strike="noStrike">
+              <a:rPr lang="en-US" sz="3200" strike="noStrike">
                 <a:solidFill>
                   <a:srgbClr val="f2f2f2"/>
                 </a:solidFill>
@@ -3276,7 +2994,7 @@
               <a:buChar char=""/>
             </a:pPr>
             <a:r>
-              <a:rPr lang="bg-BG" sz="3200" strike="noStrike">
+              <a:rPr lang="en-US" sz="3200" strike="noStrike">
                 <a:solidFill>
                   <a:srgbClr val="f2f2f2"/>
                 </a:solidFill>
@@ -3295,7 +3013,7 @@
               <a:buChar char=""/>
             </a:pPr>
             <a:r>
-              <a:rPr lang="bg-BG" sz="3200" strike="noStrike">
+              <a:rPr lang="en-US" sz="3200" strike="noStrike">
                 <a:solidFill>
                   <a:srgbClr val="f2f2f2"/>
                 </a:solidFill>
@@ -3314,7 +3032,7 @@
               <a:buChar char=""/>
             </a:pPr>
             <a:r>
-              <a:rPr lang="bg-BG" sz="3200" strike="noStrike">
+              <a:rPr lang="en-US" sz="3200" strike="noStrike">
                 <a:solidFill>
                   <a:srgbClr val="f2f2f2"/>
                 </a:solidFill>
@@ -3333,7 +3051,7 @@
               <a:buChar char=""/>
             </a:pPr>
             <a:r>
-              <a:rPr lang="bg-BG" sz="3200" strike="noStrike">
+              <a:rPr lang="en-US" sz="3200" strike="noStrike">
                 <a:solidFill>
                   <a:srgbClr val="f2f2f2"/>
                 </a:solidFill>
@@ -3396,14 +3114,14 @@
       </p:grpSpPr>
       <p:sp>
         <p:nvSpPr>
-          <p:cNvPr id="82" name="TextShape 1"/>
-          <p:cNvSpPr txBox="1"/>
+          <p:cNvPr id="76" name="CustomShape 1"/>
+          <p:cNvSpPr/>
           <p:nvPr/>
         </p:nvSpPr>
         <p:spPr>
           <a:xfrm>
             <a:off x="838080" y="685800"/>
-            <a:ext cx="8229240" cy="1142640"/>
+            <a:ext cx="8228880" cy="1142280"/>
           </a:xfrm>
           <a:prstGeom prst="rect">
             <a:avLst/>
@@ -3413,8 +3131,14 @@
             <a:noFill/>
           </a:ln>
         </p:spPr>
-        <p:txBody>
-          <a:bodyPr anchor="ctr"/>
+        <p:style>
+          <a:lnRef idx="0"/>
+          <a:fillRef idx="0"/>
+          <a:effectRef idx="0"/>
+          <a:fontRef idx="minor"/>
+        </p:style>
+        <p:txBody>
+          <a:bodyPr lIns="90000" rIns="90000" tIns="45000" bIns="45000" anchor="ctr"/>
           <a:p>
             <a:pPr>
               <a:lnSpc>
@@ -3422,7 +3146,7 @@
               </a:lnSpc>
             </a:pPr>
             <a:r>
-              <a:rPr lang="bg-BG" sz="4400" strike="noStrike">
+              <a:rPr lang="en-US" sz="4400" strike="noStrike">
                 <a:solidFill>
                   <a:srgbClr val="f79646"/>
                 </a:solidFill>
@@ -3436,14 +3160,14 @@
       </p:sp>
       <p:sp>
         <p:nvSpPr>
-          <p:cNvPr id="83" name="TextShape 2"/>
-          <p:cNvSpPr txBox="1"/>
+          <p:cNvPr id="77" name="CustomShape 2"/>
+          <p:cNvSpPr/>
           <p:nvPr/>
         </p:nvSpPr>
         <p:spPr>
           <a:xfrm>
             <a:off x="701280" y="2011680"/>
-            <a:ext cx="7619760" cy="4525560"/>
+            <a:ext cx="7619400" cy="4525200"/>
           </a:xfrm>
           <a:prstGeom prst="rect">
             <a:avLst/>
@@ -3453,8 +3177,14 @@
             <a:noFill/>
           </a:ln>
         </p:spPr>
-        <p:txBody>
-          <a:bodyPr/>
+        <p:style>
+          <a:lnRef idx="0"/>
+          <a:fillRef idx="0"/>
+          <a:effectRef idx="0"/>
+          <a:fontRef idx="minor"/>
+        </p:style>
+        <p:txBody>
+          <a:bodyPr lIns="90000" rIns="90000" tIns="45000" bIns="45000"/>
           <a:p>
             <a:pPr>
               <a:lnSpc>
@@ -3464,7 +3194,7 @@
               <a:buChar char=""/>
             </a:pPr>
             <a:r>
-              <a:rPr lang="bg-BG" sz="3200" strike="noStrike">
+              <a:rPr lang="en-US" sz="3200" strike="noStrike">
                 <a:solidFill>
                   <a:srgbClr val="f2f2f2"/>
                 </a:solidFill>
@@ -3483,7 +3213,7 @@
               <a:buChar char=""/>
             </a:pPr>
             <a:r>
-              <a:rPr lang="bg-BG" sz="3200" strike="noStrike">
+              <a:rPr lang="en-US" sz="3200" strike="noStrike">
                 <a:solidFill>
                   <a:srgbClr val="f2f2f2"/>
                 </a:solidFill>
@@ -3502,7 +3232,7 @@
               <a:buChar char=""/>
             </a:pPr>
             <a:r>
-              <a:rPr lang="bg-BG" sz="3200" strike="noStrike">
+              <a:rPr lang="en-US" sz="3200" strike="noStrike">
                 <a:solidFill>
                   <a:srgbClr val="f2f2f2"/>
                 </a:solidFill>
@@ -3521,7 +3251,7 @@
               <a:buChar char=""/>
             </a:pPr>
             <a:r>
-              <a:rPr lang="bg-BG" sz="3200" strike="noStrike">
+              <a:rPr lang="en-US" sz="3200" strike="noStrike">
                 <a:solidFill>
                   <a:srgbClr val="f2f2f2"/>
                 </a:solidFill>
@@ -3584,14 +3314,14 @@
       </p:grpSpPr>
       <p:sp>
         <p:nvSpPr>
-          <p:cNvPr id="84" name="TextShape 1"/>
-          <p:cNvSpPr txBox="1"/>
+          <p:cNvPr id="78" name="CustomShape 1"/>
+          <p:cNvSpPr/>
           <p:nvPr/>
         </p:nvSpPr>
         <p:spPr>
           <a:xfrm>
             <a:off x="838080" y="685800"/>
-            <a:ext cx="8229240" cy="1142640"/>
+            <a:ext cx="8228880" cy="1142280"/>
           </a:xfrm>
           <a:prstGeom prst="rect">
             <a:avLst/>
@@ -3601,8 +3331,14 @@
             <a:noFill/>
           </a:ln>
         </p:spPr>
-        <p:txBody>
-          <a:bodyPr anchor="ctr"/>
+        <p:style>
+          <a:lnRef idx="0"/>
+          <a:fillRef idx="0"/>
+          <a:effectRef idx="0"/>
+          <a:fontRef idx="minor"/>
+        </p:style>
+        <p:txBody>
+          <a:bodyPr lIns="90000" rIns="90000" tIns="45000" bIns="45000" anchor="ctr"/>
           <a:p>
             <a:pPr>
               <a:lnSpc>
@@ -3610,7 +3346,7 @@
               </a:lnSpc>
             </a:pPr>
             <a:r>
-              <a:rPr lang="bg-BG" sz="4400" strike="noStrike">
+              <a:rPr lang="en-US" sz="4400" strike="noStrike">
                 <a:solidFill>
                   <a:srgbClr val="f79646"/>
                 </a:solidFill>
@@ -3624,14 +3360,14 @@
       </p:sp>
       <p:sp>
         <p:nvSpPr>
-          <p:cNvPr id="85" name="TextShape 2"/>
-          <p:cNvSpPr txBox="1"/>
+          <p:cNvPr id="79" name="CustomShape 2"/>
+          <p:cNvSpPr/>
           <p:nvPr/>
         </p:nvSpPr>
         <p:spPr>
           <a:xfrm>
             <a:off x="762120" y="1676520"/>
-            <a:ext cx="7619760" cy="4525560"/>
+            <a:ext cx="7619400" cy="4525200"/>
           </a:xfrm>
           <a:prstGeom prst="rect">
             <a:avLst/>
@@ -3641,8 +3377,14 @@
             <a:noFill/>
           </a:ln>
         </p:spPr>
-        <p:txBody>
-          <a:bodyPr/>
+        <p:style>
+          <a:lnRef idx="0"/>
+          <a:fillRef idx="0"/>
+          <a:effectRef idx="0"/>
+          <a:fontRef idx="minor"/>
+        </p:style>
+        <p:txBody>
+          <a:bodyPr lIns="90000" rIns="90000" tIns="45000" bIns="45000"/>
           <a:p>
             <a:pPr>
               <a:lnSpc>
@@ -3652,7 +3394,7 @@
               <a:buChar char=""/>
             </a:pPr>
             <a:r>
-              <a:rPr lang="bg-BG" sz="3200" strike="noStrike">
+              <a:rPr lang="en-US" sz="3200" strike="noStrike">
                 <a:solidFill>
                   <a:srgbClr val="f2f2f2"/>
                 </a:solidFill>
@@ -3671,7 +3413,7 @@
               <a:buChar char=""/>
             </a:pPr>
             <a:r>
-              <a:rPr lang="bg-BG" sz="3200" strike="noStrike">
+              <a:rPr lang="en-US" sz="3200" strike="noStrike">
                 <a:solidFill>
                   <a:srgbClr val="f2f2f2"/>
                 </a:solidFill>
@@ -3690,7 +3432,7 @@
               <a:buChar char=""/>
             </a:pPr>
             <a:r>
-              <a:rPr lang="bg-BG" sz="3200" strike="noStrike">
+              <a:rPr lang="en-US" sz="3200" strike="noStrike">
                 <a:solidFill>
                   <a:srgbClr val="f2f2f2"/>
                 </a:solidFill>
@@ -3709,7 +3451,7 @@
               <a:buChar char=""/>
             </a:pPr>
             <a:r>
-              <a:rPr lang="bg-BG" sz="3200" strike="noStrike">
+              <a:rPr lang="en-US" sz="3200" strike="noStrike">
                 <a:solidFill>
                   <a:srgbClr val="f2f2f2"/>
                 </a:solidFill>
@@ -3780,14 +3522,14 @@
       </p:grpSpPr>
       <p:sp>
         <p:nvSpPr>
-          <p:cNvPr id="86" name="TextShape 1"/>
-          <p:cNvSpPr txBox="1"/>
+          <p:cNvPr id="80" name="CustomShape 1"/>
+          <p:cNvSpPr/>
           <p:nvPr/>
         </p:nvSpPr>
         <p:spPr>
           <a:xfrm>
-            <a:off x="838080" y="685800"/>
-            <a:ext cx="8229240" cy="1142640"/>
+            <a:off x="823680" y="702000"/>
+            <a:ext cx="8228880" cy="1142280"/>
           </a:xfrm>
           <a:prstGeom prst="rect">
             <a:avLst/>
@@ -3797,8 +3539,14 @@
             <a:noFill/>
           </a:ln>
         </p:spPr>
-        <p:txBody>
-          <a:bodyPr anchor="ctr"/>
+        <p:style>
+          <a:lnRef idx="0"/>
+          <a:fillRef idx="0"/>
+          <a:effectRef idx="0"/>
+          <a:fontRef idx="minor"/>
+        </p:style>
+        <p:txBody>
+          <a:bodyPr lIns="90000" rIns="90000" tIns="45000" bIns="45000" anchor="ctr"/>
           <a:p>
             <a:pPr>
               <a:lnSpc>
@@ -3806,7 +3554,7 @@
               </a:lnSpc>
             </a:pPr>
             <a:r>
-              <a:rPr lang="bg-BG" sz="4400" strike="noStrike">
+              <a:rPr lang="en-US" sz="4400" strike="noStrike">
                 <a:solidFill>
                   <a:srgbClr val="f79646"/>
                 </a:solidFill>
@@ -3820,14 +3568,14 @@
       </p:sp>
       <p:sp>
         <p:nvSpPr>
-          <p:cNvPr id="87" name="TextShape 2"/>
-          <p:cNvSpPr txBox="1"/>
+          <p:cNvPr id="81" name="CustomShape 2"/>
+          <p:cNvSpPr/>
           <p:nvPr/>
         </p:nvSpPr>
         <p:spPr>
           <a:xfrm>
-            <a:off x="762120" y="1676520"/>
-            <a:ext cx="7619760" cy="4525560"/>
+            <a:off x="884520" y="2698560"/>
+            <a:ext cx="7619400" cy="4525200"/>
           </a:xfrm>
           <a:prstGeom prst="rect">
             <a:avLst/>
@@ -3837,8 +3585,14 @@
             <a:noFill/>
           </a:ln>
         </p:spPr>
-        <p:txBody>
-          <a:bodyPr/>
+        <p:style>
+          <a:lnRef idx="0"/>
+          <a:fillRef idx="0"/>
+          <a:effectRef idx="0"/>
+          <a:fontRef idx="minor"/>
+        </p:style>
+        <p:txBody>
+          <a:bodyPr lIns="90000" rIns="90000" tIns="45000" bIns="45000"/>
           <a:p>
             <a:pPr>
               <a:lnSpc>
@@ -3880,7 +3634,7 @@
               <a:buChar char=""/>
             </a:pPr>
             <a:r>
-              <a:rPr lang="bg-BG" sz="3200" strike="noStrike">
+              <a:rPr lang="en-US" sz="3200" strike="noStrike">
                 <a:solidFill>
                   <a:srgbClr val="f2f2f2"/>
                 </a:solidFill>
@@ -3889,7 +3643,7 @@
               <a:t>Николай Валентинов Иванов</a:t>
             </a:r>
             <a:r>
-              <a:rPr lang="bg-BG" sz="3200" strike="noStrike">
+              <a:rPr lang="en-US" sz="3200" strike="noStrike">
                 <a:solidFill>
                   <a:srgbClr val="f2f2f2"/>
                 </a:solidFill>
@@ -3908,7 +3662,7 @@
               <a:buChar char=""/>
             </a:pPr>
             <a:r>
-              <a:rPr lang="bg-BG" sz="3200" strike="noStrike">
+              <a:rPr lang="en-US" sz="3200" strike="noStrike">
                 <a:solidFill>
                   <a:srgbClr val="f2f2f2"/>
                 </a:solidFill>
@@ -3927,7 +3681,7 @@
               <a:buChar char=""/>
             </a:pPr>
             <a:r>
-              <a:rPr lang="bg-BG" sz="3200" strike="noStrike">
+              <a:rPr lang="en-US" sz="3200" strike="noStrike">
                 <a:solidFill>
                   <a:srgbClr val="f2f2f2"/>
                 </a:solidFill>
@@ -3941,7 +3695,7 @@
       </p:sp>
       <p:pic>
         <p:nvPicPr>
-          <p:cNvPr id="88" name="Picture 2" descr=""/>
+          <p:cNvPr id="82" name="Picture 2" descr=""/>
           <p:cNvPicPr/>
           <p:nvPr/>
         </p:nvPicPr>
@@ -3951,8 +3705,8 @@
         </p:blipFill>
         <p:spPr>
           <a:xfrm>
-            <a:off x="3352680" y="1828800"/>
-            <a:ext cx="2031480" cy="2031480"/>
+            <a:off x="3338280" y="1845000"/>
+            <a:ext cx="2031120" cy="2031120"/>
           </a:xfrm>
           <a:prstGeom prst="rect">
             <a:avLst/>
@@ -4013,14 +3767,14 @@
       </p:grpSpPr>
       <p:sp>
         <p:nvSpPr>
-          <p:cNvPr id="89" name="TextShape 1"/>
-          <p:cNvSpPr txBox="1"/>
+          <p:cNvPr id="83" name="CustomShape 1"/>
+          <p:cNvSpPr/>
           <p:nvPr/>
         </p:nvSpPr>
         <p:spPr>
           <a:xfrm>
-            <a:off x="838080" y="685800"/>
-            <a:ext cx="8229240" cy="1142640"/>
+            <a:off x="366480" y="548640"/>
+            <a:ext cx="8228880" cy="1142280"/>
           </a:xfrm>
           <a:prstGeom prst="rect">
             <a:avLst/>
@@ -4030,16 +3784,22 @@
             <a:noFill/>
           </a:ln>
         </p:spPr>
-        <p:txBody>
-          <a:bodyPr anchor="ctr"/>
-          <a:p>
-            <a:pPr>
+        <p:style>
+          <a:lnRef idx="0"/>
+          <a:fillRef idx="0"/>
+          <a:effectRef idx="0"/>
+          <a:fontRef idx="minor"/>
+        </p:style>
+        <p:txBody>
+          <a:bodyPr lIns="90000" rIns="90000" tIns="45000" bIns="45000" anchor="ctr"/>
+          <a:p>
+            <a:pPr algn="ctr">
               <a:lnSpc>
                 <a:spcPct val="100000"/>
               </a:lnSpc>
             </a:pPr>
             <a:r>
-              <a:rPr lang="bg-BG" sz="4400" strike="noStrike">
+              <a:rPr lang="en-US" sz="4400" strike="noStrike">
                 <a:solidFill>
                   <a:srgbClr val="f79646"/>
                 </a:solidFill>
@@ -4053,14 +3813,14 @@
       </p:sp>
       <p:sp>
         <p:nvSpPr>
-          <p:cNvPr id="90" name="TextShape 2"/>
-          <p:cNvSpPr txBox="1"/>
+          <p:cNvPr id="84" name="CustomShape 2"/>
+          <p:cNvSpPr/>
           <p:nvPr/>
         </p:nvSpPr>
         <p:spPr>
           <a:xfrm>
             <a:off x="762120" y="1676520"/>
-            <a:ext cx="7619760" cy="4525560"/>
+            <a:ext cx="7619400" cy="4525200"/>
           </a:xfrm>
           <a:prstGeom prst="rect">
             <a:avLst/>
@@ -4070,8 +3830,14 @@
             <a:noFill/>
           </a:ln>
         </p:spPr>
-        <p:txBody>
-          <a:bodyPr/>
+        <p:style>
+          <a:lnRef idx="0"/>
+          <a:fillRef idx="0"/>
+          <a:effectRef idx="0"/>
+          <a:fontRef idx="minor"/>
+        </p:style>
+        <p:txBody>
+          <a:bodyPr lIns="90000" rIns="90000" tIns="45000" bIns="45000"/>
           <a:p>
             <a:pPr>
               <a:lnSpc>
@@ -4113,7 +3879,7 @@
               <a:buChar char=""/>
             </a:pPr>
             <a:r>
-              <a:rPr lang="bg-BG" sz="3200" strike="noStrike">
+              <a:rPr lang="en-US" sz="3200" strike="noStrike">
                 <a:solidFill>
                   <a:srgbClr val="f2f2f2"/>
                 </a:solidFill>
@@ -4122,7 +3888,7 @@
               <a:t>Soft Intellect Academy</a:t>
             </a:r>
             <a:r>
-              <a:rPr lang="bg-BG" sz="3200" strike="noStrike">
+              <a:rPr lang="en-US" sz="3200" strike="noStrike">
                 <a:solidFill>
                   <a:srgbClr val="f2f2f2"/>
                 </a:solidFill>
@@ -4141,7 +3907,7 @@
               <a:buChar char=""/>
             </a:pPr>
             <a:r>
-              <a:rPr lang="bg-BG" sz="3200" strike="noStrike">
+              <a:rPr lang="en-US" sz="3200" strike="noStrike">
                 <a:solidFill>
                   <a:srgbClr val="f2f2f2"/>
                 </a:solidFill>
@@ -4160,7 +3926,7 @@
               <a:buChar char=""/>
             </a:pPr>
             <a:r>
-              <a:rPr lang="bg-BG" sz="3200" strike="noStrike">
+              <a:rPr lang="en-US" sz="3200" strike="noStrike">
                 <a:solidFill>
                   <a:srgbClr val="f2f2f2"/>
                 </a:solidFill>
@@ -4169,7 +3935,7 @@
               <a:t>Уеб сайт: </a:t>
             </a:r>
             <a:r>
-              <a:rPr lang="bg-BG" sz="3200" strike="noStrike" u="sng">
+              <a:rPr lang="en-US" sz="3200" strike="noStrike" u="sng">
                 <a:solidFill>
                   <a:srgbClr val="0000ff"/>
                 </a:solidFill>
@@ -4178,7 +3944,7 @@
               <a:t>http://soft-intellect.com</a:t>
             </a:r>
             <a:r>
-              <a:rPr lang="bg-BG" sz="3200" strike="noStrike">
+              <a:rPr lang="en-US" sz="3200" strike="noStrike">
                 <a:solidFill>
                   <a:srgbClr val="00b050"/>
                 </a:solidFill>
@@ -4192,7 +3958,7 @@
       </p:sp>
       <p:pic>
         <p:nvPicPr>
-          <p:cNvPr id="91" name="Picture 2" descr=""/>
+          <p:cNvPr id="85" name="Picture 2" descr=""/>
           <p:cNvPicPr/>
           <p:nvPr/>
         </p:nvPicPr>
@@ -4202,8 +3968,8 @@
         </p:blipFill>
         <p:spPr>
           <a:xfrm>
-            <a:off x="1835280" y="1441440"/>
-            <a:ext cx="5327280" cy="2520720"/>
+            <a:off x="1828800" y="914400"/>
+            <a:ext cx="5326920" cy="2520360"/>
           </a:xfrm>
           <a:prstGeom prst="rect">
             <a:avLst/>

</xml_diff>